<commit_message>
adding facet spacing as an option
</commit_message>
<xml_diff>
--- a/example/output2.pptx
+++ b/example/output2.pptx
@@ -5,30 +5,34 @@
     <p:sldMasterId id="2147483677" r:id="rId1"/>
   </p:sldMasterIdLst>
   <p:notesMasterIdLst>
-    <p:notesMasterId r:id="rId8"/>
+    <p:notesMasterId r:id="rId4"/>
   </p:notesMasterIdLst>
   <p:sldIdLst>
     <p:sldId id="256" r:id="rId2"/>
     <p:sldId id="301" r:id="rId3"/>
-    <p:sldId id="302" r:id="rId4"/>
-    <p:sldId id="303" r:id="rId5"/>
-    <p:sldId id="304" r:id="rId6"/>
-    <p:sldId id="305" r:id="rId7"/>
+    <p:sldId id="302" r:id="rId17"/>
+    <p:sldId id="303" r:id="rId18"/>
+    <p:sldId id="304" r:id="rId19"/>
+    <p:sldId id="305" r:id="rId20"/>
+    <p:sldId id="306" r:id="rId21"/>
+    <p:sldId id="307" r:id="rId22"/>
+    <p:sldId id="308" r:id="rId23"/>
+    <p:sldId id="309" r:id="rId24"/>
   </p:sldIdLst>
   <p:sldSz cx="9144000" cy="5143500" type="screen16x9"/>
   <p:notesSz cx="6858000" cy="9144000"/>
   <p:embeddedFontLst>
     <p:embeddedFont>
-      <p:font typeface="Open Sans" panose="020B0604020202020204" charset="0"/>
+      <p:font typeface="Open Sans" panose="020B0606030504020204" pitchFamily="34" charset="0"/>
+      <p:regular r:id="rId5"/>
+      <p:bold r:id="rId6"/>
+      <p:italic r:id="rId7"/>
+      <p:boldItalic r:id="rId8"/>
+    </p:embeddedFont>
+    <p:embeddedFont>
+      <p:font typeface="Oswald" panose="00000500000000000000" pitchFamily="2" charset="0"/>
       <p:regular r:id="rId9"/>
       <p:bold r:id="rId10"/>
-      <p:italic r:id="rId11"/>
-      <p:boldItalic r:id="rId12"/>
-    </p:embeddedFont>
-    <p:embeddedFont>
-      <p:font typeface="Oswald" panose="020B0604020202020204" charset="0"/>
-      <p:regular r:id="rId13"/>
-      <p:bold r:id="rId14"/>
     </p:embeddedFont>
   </p:embeddedFontLst>
   <p:defaultTextStyle>
@@ -266,6 +270,79 @@
     </p:ext>
   </p:extLst>
 </p:presentation>
+</file>
+
+<file path=ppt/revisionInfo.xml><?xml version="1.0" encoding="utf-8"?>
+<p1510:revInfo xmlns:a="http://schemas.openxmlformats.org/drawingml/2006/main" xmlns:r="http://schemas.openxmlformats.org/officeDocument/2006/relationships" xmlns:p1510="http://schemas.microsoft.com/office/powerpoint/2015/10/main">
+  <p1510:revLst>
+    <p1510:client id="{69BD0B06-4E48-4367-942A-3F047875BEAC}" v="2" dt="2022-08-09T23:54:50.721"/>
+  </p1510:revLst>
+</p1510:revInfo>
+</file>
+
+<file path=ppt/changesInfos/changesInfo1.xml><?xml version="1.0" encoding="utf-8"?>
+<pc:chgInfo xmlns:a="http://schemas.openxmlformats.org/drawingml/2006/main" xmlns:r="http://schemas.openxmlformats.org/officeDocument/2006/relationships" xmlns:ac="http://schemas.microsoft.com/office/drawing/2013/main/command" xmlns:pc="http://schemas.microsoft.com/office/powerpoint/2013/main/command">
+  <pc:docChgLst>
+    <pc:chgData name="Jonathan Boone" userId="29b7fe5d-38e5-46e0-ab51-dda2ee48115b" providerId="ADAL" clId="{69BD0B06-4E48-4367-942A-3F047875BEAC}"/>
+    <pc:docChg chg="custSel modMainMaster">
+      <pc:chgData name="Jonathan Boone" userId="29b7fe5d-38e5-46e0-ab51-dda2ee48115b" providerId="ADAL" clId="{69BD0B06-4E48-4367-942A-3F047875BEAC}" dt="2022-08-09T23:55:06.998" v="6" actId="1076"/>
+      <pc:docMkLst>
+        <pc:docMk/>
+      </pc:docMkLst>
+      <pc:sldMasterChg chg="modSldLayout">
+        <pc:chgData name="Jonathan Boone" userId="29b7fe5d-38e5-46e0-ab51-dda2ee48115b" providerId="ADAL" clId="{69BD0B06-4E48-4367-942A-3F047875BEAC}" dt="2022-08-09T23:55:06.998" v="6" actId="1076"/>
+        <pc:sldMasterMkLst>
+          <pc:docMk/>
+          <pc:sldMasterMk cId="0" sldId="2147483677"/>
+        </pc:sldMasterMkLst>
+        <pc:sldLayoutChg chg="addSp delSp modSp mod">
+          <pc:chgData name="Jonathan Boone" userId="29b7fe5d-38e5-46e0-ab51-dda2ee48115b" providerId="ADAL" clId="{69BD0B06-4E48-4367-942A-3F047875BEAC}" dt="2022-08-09T23:55:06.998" v="6" actId="1076"/>
+          <pc:sldLayoutMkLst>
+            <pc:docMk/>
+            <pc:sldMasterMk cId="0" sldId="2147483677"/>
+            <pc:sldLayoutMk cId="2250001514" sldId="2147483678"/>
+          </pc:sldLayoutMkLst>
+          <pc:spChg chg="add del">
+            <ac:chgData name="Jonathan Boone" userId="29b7fe5d-38e5-46e0-ab51-dda2ee48115b" providerId="ADAL" clId="{69BD0B06-4E48-4367-942A-3F047875BEAC}" dt="2022-08-09T23:54:50.721" v="1" actId="11529"/>
+            <ac:spMkLst>
+              <pc:docMk/>
+              <pc:sldMasterMk cId="0" sldId="2147483677"/>
+              <pc:sldLayoutMk cId="2250001514" sldId="2147483678"/>
+              <ac:spMk id="2" creationId="{84C09B71-EDBE-4F48-A0EC-4EBB9370BB69}"/>
+            </ac:spMkLst>
+          </pc:spChg>
+          <pc:spChg chg="del">
+            <ac:chgData name="Jonathan Boone" userId="29b7fe5d-38e5-46e0-ab51-dda2ee48115b" providerId="ADAL" clId="{69BD0B06-4E48-4367-942A-3F047875BEAC}" dt="2022-08-09T23:54:30.950" v="0" actId="478"/>
+            <ac:spMkLst>
+              <pc:docMk/>
+              <pc:sldMasterMk cId="0" sldId="2147483677"/>
+              <pc:sldLayoutMk cId="2250001514" sldId="2147483678"/>
+              <ac:spMk id="3" creationId="{21C30B23-7255-4B2F-B01A-CBC9665B1829}"/>
+            </ac:spMkLst>
+          </pc:spChg>
+          <pc:spChg chg="add mod">
+            <ac:chgData name="Jonathan Boone" userId="29b7fe5d-38e5-46e0-ab51-dda2ee48115b" providerId="ADAL" clId="{69BD0B06-4E48-4367-942A-3F047875BEAC}" dt="2022-08-09T23:55:06.998" v="6" actId="1076"/>
+            <ac:spMkLst>
+              <pc:docMk/>
+              <pc:sldMasterMk cId="0" sldId="2147483677"/>
+              <pc:sldLayoutMk cId="2250001514" sldId="2147483678"/>
+              <ac:spMk id="4" creationId="{A3980C78-CBC5-4CD4-BEBA-3B0DBBC36EBE}"/>
+            </ac:spMkLst>
+          </pc:spChg>
+          <pc:spChg chg="mod">
+            <ac:chgData name="Jonathan Boone" userId="29b7fe5d-38e5-46e0-ab51-dda2ee48115b" providerId="ADAL" clId="{69BD0B06-4E48-4367-942A-3F047875BEAC}" dt="2022-08-09T23:54:59.450" v="4" actId="14100"/>
+            <ac:spMkLst>
+              <pc:docMk/>
+              <pc:sldMasterMk cId="0" sldId="2147483677"/>
+              <pc:sldLayoutMk cId="2250001514" sldId="2147483678"/>
+              <ac:spMk id="5" creationId="{078ED1F0-F7D7-45CF-AD0A-0B379E8D0AC8}"/>
+            </ac:spMkLst>
+          </pc:spChg>
+        </pc:sldLayoutChg>
+      </pc:sldMasterChg>
+    </pc:docChg>
+  </pc:docChgLst>
+</pc:chgInfo>
 </file>
 
 <file path=ppt/notesMasters/notesMaster1.xml><?xml version="1.0" encoding="utf-8"?>
@@ -2829,6 +2906,1370 @@
 </file>
 
 <file path=ppt/slideLayouts/slideLayout3.xml><?xml version="1.0" encoding="utf-8"?>
+<p:sldLayout xmlns:a="http://schemas.openxmlformats.org/drawingml/2006/main" xmlns:r="http://schemas.openxmlformats.org/officeDocument/2006/relationships" xmlns:p="http://schemas.openxmlformats.org/presentationml/2006/main" matchingName="Only Title 4" preserve="1" userDrawn="1">
+  <p:cSld name="1_Only Title 4">
+    <p:spTree>
+      <p:nvGrpSpPr>
+        <p:cNvPr id="1" name="Shape 301"/>
+        <p:cNvGrpSpPr/>
+        <p:nvPr/>
+      </p:nvGrpSpPr>
+      <p:grpSpPr>
+        <a:xfrm>
+          <a:off x="0" y="0"/>
+          <a:ext cx="0" cy="0"/>
+          <a:chOff x="0" y="0"/>
+          <a:chExt cx="0" cy="0"/>
+        </a:xfrm>
+      </p:grpSpPr>
+      <p:sp>
+        <p:nvSpPr>
+          <p:cNvPr id="302" name="Google Shape;302;p27"/>
+          <p:cNvSpPr txBox="1">
+            <a:spLocks noGrp="1"/>
+          </p:cNvSpPr>
+          <p:nvPr>
+            <p:ph type="title"/>
+          </p:nvPr>
+        </p:nvSpPr>
+        <p:spPr>
+          <a:xfrm>
+            <a:off x="130785" y="164370"/>
+            <a:ext cx="7708800" cy="483900"/>
+          </a:xfrm>
+          <a:prstGeom prst="rect">
+            <a:avLst/>
+          </a:prstGeom>
+        </p:spPr>
+        <p:txBody>
+          <a:bodyPr spcFirstLastPara="1" wrap="square" lIns="91425" tIns="91425" rIns="91425" bIns="91425" anchor="t" anchorCtr="0">
+            <a:noAutofit/>
+          </a:bodyPr>
+          <a:lstStyle>
+            <a:lvl1pPr lvl="0" algn="l" rtl="0">
+              <a:spcBef>
+                <a:spcPts val="0"/>
+              </a:spcBef>
+              <a:spcAft>
+                <a:spcPts val="0"/>
+              </a:spcAft>
+              <a:buSzPts val="2400"/>
+              <a:buNone/>
+              <a:defRPr sz="2400"/>
+            </a:lvl1pPr>
+            <a:lvl2pPr lvl="1" algn="ctr" rtl="0">
+              <a:spcBef>
+                <a:spcPts val="0"/>
+              </a:spcBef>
+              <a:spcAft>
+                <a:spcPts val="0"/>
+              </a:spcAft>
+              <a:buSzPts val="2400"/>
+              <a:buNone/>
+              <a:defRPr sz="2400"/>
+            </a:lvl2pPr>
+            <a:lvl3pPr lvl="2" algn="ctr" rtl="0">
+              <a:spcBef>
+                <a:spcPts val="0"/>
+              </a:spcBef>
+              <a:spcAft>
+                <a:spcPts val="0"/>
+              </a:spcAft>
+              <a:buSzPts val="2400"/>
+              <a:buNone/>
+              <a:defRPr sz="2400"/>
+            </a:lvl3pPr>
+            <a:lvl4pPr lvl="3" algn="ctr" rtl="0">
+              <a:spcBef>
+                <a:spcPts val="0"/>
+              </a:spcBef>
+              <a:spcAft>
+                <a:spcPts val="0"/>
+              </a:spcAft>
+              <a:buSzPts val="2400"/>
+              <a:buNone/>
+              <a:defRPr sz="2400"/>
+            </a:lvl4pPr>
+            <a:lvl5pPr lvl="4" algn="ctr" rtl="0">
+              <a:spcBef>
+                <a:spcPts val="0"/>
+              </a:spcBef>
+              <a:spcAft>
+                <a:spcPts val="0"/>
+              </a:spcAft>
+              <a:buSzPts val="2400"/>
+              <a:buNone/>
+              <a:defRPr sz="2400"/>
+            </a:lvl5pPr>
+            <a:lvl6pPr lvl="5" algn="ctr" rtl="0">
+              <a:spcBef>
+                <a:spcPts val="0"/>
+              </a:spcBef>
+              <a:spcAft>
+                <a:spcPts val="0"/>
+              </a:spcAft>
+              <a:buSzPts val="2400"/>
+              <a:buNone/>
+              <a:defRPr sz="2400"/>
+            </a:lvl6pPr>
+            <a:lvl7pPr lvl="6" algn="ctr" rtl="0">
+              <a:spcBef>
+                <a:spcPts val="0"/>
+              </a:spcBef>
+              <a:spcAft>
+                <a:spcPts val="0"/>
+              </a:spcAft>
+              <a:buSzPts val="2400"/>
+              <a:buNone/>
+              <a:defRPr sz="2400"/>
+            </a:lvl7pPr>
+            <a:lvl8pPr lvl="7" algn="ctr" rtl="0">
+              <a:spcBef>
+                <a:spcPts val="0"/>
+              </a:spcBef>
+              <a:spcAft>
+                <a:spcPts val="0"/>
+              </a:spcAft>
+              <a:buSzPts val="2400"/>
+              <a:buNone/>
+              <a:defRPr sz="2400"/>
+            </a:lvl8pPr>
+            <a:lvl9pPr lvl="8" algn="ctr" rtl="0">
+              <a:spcBef>
+                <a:spcPts val="0"/>
+              </a:spcBef>
+              <a:spcAft>
+                <a:spcPts val="0"/>
+              </a:spcAft>
+              <a:buSzPts val="2400"/>
+              <a:buNone/>
+              <a:defRPr sz="2400"/>
+            </a:lvl9pPr>
+          </a:lstStyle>
+          <a:p>
+            <a:endParaRPr/>
+          </a:p>
+        </p:txBody>
+      </p:sp>
+      <p:grpSp>
+        <p:nvGrpSpPr>
+          <p:cNvPr id="303" name="Google Shape;303;p27"/>
+          <p:cNvGrpSpPr/>
+          <p:nvPr/>
+        </p:nvGrpSpPr>
+        <p:grpSpPr>
+          <a:xfrm>
+            <a:off x="5978544" y="3960231"/>
+            <a:ext cx="3165452" cy="1179524"/>
+            <a:chOff x="5978544" y="3960231"/>
+            <a:chExt cx="3165452" cy="1179524"/>
+          </a:xfrm>
+        </p:grpSpPr>
+        <p:sp>
+          <p:nvSpPr>
+            <p:cNvPr id="304" name="Google Shape;304;p27"/>
+            <p:cNvSpPr/>
+            <p:nvPr/>
+          </p:nvSpPr>
+          <p:spPr>
+            <a:xfrm flipH="1">
+              <a:off x="6326888" y="4420653"/>
+              <a:ext cx="2817107" cy="719102"/>
+            </a:xfrm>
+            <a:custGeom>
+              <a:avLst/>
+              <a:gdLst/>
+              <a:ahLst/>
+              <a:cxnLst/>
+              <a:rect l="l" t="t" r="r" b="b"/>
+              <a:pathLst>
+                <a:path w="90025" h="22980" extrusionOk="0">
+                  <a:moveTo>
+                    <a:pt x="45816" y="1"/>
+                  </a:moveTo>
+                  <a:cubicBezTo>
+                    <a:pt x="39946" y="1"/>
+                    <a:pt x="34946" y="4358"/>
+                    <a:pt x="32934" y="10502"/>
+                  </a:cubicBezTo>
+                  <a:cubicBezTo>
+                    <a:pt x="30469" y="8097"/>
+                    <a:pt x="27100" y="6609"/>
+                    <a:pt x="23373" y="6609"/>
+                  </a:cubicBezTo>
+                  <a:cubicBezTo>
+                    <a:pt x="16634" y="6609"/>
+                    <a:pt x="11038" y="11490"/>
+                    <a:pt x="9907" y="17920"/>
+                  </a:cubicBezTo>
+                  <a:cubicBezTo>
+                    <a:pt x="8990" y="17467"/>
+                    <a:pt x="7966" y="17193"/>
+                    <a:pt x="6871" y="17193"/>
+                  </a:cubicBezTo>
+                  <a:cubicBezTo>
+                    <a:pt x="3430" y="17193"/>
+                    <a:pt x="584" y="19694"/>
+                    <a:pt x="1" y="22980"/>
+                  </a:cubicBezTo>
+                  <a:lnTo>
+                    <a:pt x="90012" y="22980"/>
+                  </a:lnTo>
+                  <a:cubicBezTo>
+                    <a:pt x="90012" y="22968"/>
+                    <a:pt x="90024" y="22956"/>
+                    <a:pt x="90024" y="22956"/>
+                  </a:cubicBezTo>
+                  <a:cubicBezTo>
+                    <a:pt x="90024" y="17574"/>
+                    <a:pt x="85655" y="13205"/>
+                    <a:pt x="80273" y="13205"/>
+                  </a:cubicBezTo>
+                  <a:cubicBezTo>
+                    <a:pt x="78916" y="13205"/>
+                    <a:pt x="77618" y="13491"/>
+                    <a:pt x="76439" y="14002"/>
+                  </a:cubicBezTo>
+                  <a:cubicBezTo>
+                    <a:pt x="74879" y="8407"/>
+                    <a:pt x="69772" y="4299"/>
+                    <a:pt x="63688" y="4299"/>
+                  </a:cubicBezTo>
+                  <a:cubicBezTo>
+                    <a:pt x="61116" y="4299"/>
+                    <a:pt x="58723" y="5049"/>
+                    <a:pt x="56699" y="6311"/>
+                  </a:cubicBezTo>
+                  <a:cubicBezTo>
+                    <a:pt x="54163" y="2477"/>
+                    <a:pt x="50233" y="1"/>
+                    <a:pt x="45816" y="1"/>
+                  </a:cubicBezTo>
+                  <a:close/>
+                </a:path>
+              </a:pathLst>
+            </a:custGeom>
+            <a:solidFill>
+              <a:srgbClr val="9FEAFF"/>
+            </a:solidFill>
+            <a:ln>
+              <a:noFill/>
+            </a:ln>
+          </p:spPr>
+          <p:txBody>
+            <a:bodyPr spcFirstLastPara="1" wrap="square" lIns="91425" tIns="91425" rIns="91425" bIns="91425" anchor="ctr" anchorCtr="0">
+              <a:noAutofit/>
+            </a:bodyPr>
+            <a:lstStyle/>
+            <a:p>
+              <a:pPr marL="0" lvl="0" indent="0" algn="l" rtl="0">
+                <a:spcBef>
+                  <a:spcPts val="0"/>
+                </a:spcBef>
+                <a:spcAft>
+                  <a:spcPts val="0"/>
+                </a:spcAft>
+                <a:buNone/>
+              </a:pPr>
+              <a:endParaRPr/>
+            </a:p>
+          </p:txBody>
+        </p:sp>
+        <p:sp>
+          <p:nvSpPr>
+            <p:cNvPr id="305" name="Google Shape;305;p27"/>
+            <p:cNvSpPr/>
+            <p:nvPr/>
+          </p:nvSpPr>
+          <p:spPr>
+            <a:xfrm>
+              <a:off x="7325802" y="3960231"/>
+              <a:ext cx="1548095" cy="1179524"/>
+            </a:xfrm>
+            <a:custGeom>
+              <a:avLst/>
+              <a:gdLst/>
+              <a:ahLst/>
+              <a:cxnLst/>
+              <a:rect l="l" t="t" r="r" b="b"/>
+              <a:pathLst>
+                <a:path w="48156" h="36691" extrusionOk="0">
+                  <a:moveTo>
+                    <a:pt x="25980" y="13116"/>
+                  </a:moveTo>
+                  <a:cubicBezTo>
+                    <a:pt x="26313" y="13211"/>
+                    <a:pt x="26635" y="13306"/>
+                    <a:pt x="26968" y="13425"/>
+                  </a:cubicBezTo>
+                  <a:cubicBezTo>
+                    <a:pt x="27040" y="13842"/>
+                    <a:pt x="27087" y="14271"/>
+                    <a:pt x="27040" y="14687"/>
+                  </a:cubicBezTo>
+                  <a:cubicBezTo>
+                    <a:pt x="27004" y="15021"/>
+                    <a:pt x="26897" y="15330"/>
+                    <a:pt x="26790" y="15628"/>
+                  </a:cubicBezTo>
+                  <a:cubicBezTo>
+                    <a:pt x="26183" y="15616"/>
+                    <a:pt x="25968" y="15354"/>
+                    <a:pt x="25932" y="14604"/>
+                  </a:cubicBezTo>
+                  <a:cubicBezTo>
+                    <a:pt x="25921" y="14259"/>
+                    <a:pt x="25944" y="13925"/>
+                    <a:pt x="25956" y="13604"/>
+                  </a:cubicBezTo>
+                  <a:cubicBezTo>
+                    <a:pt x="25968" y="13437"/>
+                    <a:pt x="25980" y="13283"/>
+                    <a:pt x="25980" y="13116"/>
+                  </a:cubicBezTo>
+                  <a:close/>
+                  <a:moveTo>
+                    <a:pt x="19551" y="13854"/>
+                  </a:moveTo>
+                  <a:lnTo>
+                    <a:pt x="19551" y="13854"/>
+                  </a:lnTo>
+                  <a:cubicBezTo>
+                    <a:pt x="19444" y="14604"/>
+                    <a:pt x="19444" y="15378"/>
+                    <a:pt x="19622" y="16235"/>
+                  </a:cubicBezTo>
+                  <a:cubicBezTo>
+                    <a:pt x="19646" y="16378"/>
+                    <a:pt x="19706" y="16521"/>
+                    <a:pt x="19765" y="16664"/>
+                  </a:cubicBezTo>
+                  <a:cubicBezTo>
+                    <a:pt x="19848" y="16866"/>
+                    <a:pt x="19932" y="17081"/>
+                    <a:pt x="19872" y="17200"/>
+                  </a:cubicBezTo>
+                  <a:cubicBezTo>
+                    <a:pt x="19860" y="17223"/>
+                    <a:pt x="19825" y="17259"/>
+                    <a:pt x="19789" y="17283"/>
+                  </a:cubicBezTo>
+                  <a:cubicBezTo>
+                    <a:pt x="19706" y="17176"/>
+                    <a:pt x="19622" y="17069"/>
+                    <a:pt x="19527" y="16962"/>
+                  </a:cubicBezTo>
+                  <a:cubicBezTo>
+                    <a:pt x="19325" y="16712"/>
+                    <a:pt x="19122" y="16461"/>
+                    <a:pt x="18991" y="16188"/>
+                  </a:cubicBezTo>
+                  <a:cubicBezTo>
+                    <a:pt x="18765" y="15676"/>
+                    <a:pt x="18682" y="15045"/>
+                    <a:pt x="18717" y="14426"/>
+                  </a:cubicBezTo>
+                  <a:cubicBezTo>
+                    <a:pt x="19003" y="14211"/>
+                    <a:pt x="19277" y="14021"/>
+                    <a:pt x="19551" y="13854"/>
+                  </a:cubicBezTo>
+                  <a:close/>
+                  <a:moveTo>
+                    <a:pt x="27409" y="13580"/>
+                  </a:moveTo>
+                  <a:lnTo>
+                    <a:pt x="27409" y="13580"/>
+                  </a:lnTo>
+                  <a:cubicBezTo>
+                    <a:pt x="27885" y="13747"/>
+                    <a:pt x="28361" y="13937"/>
+                    <a:pt x="28861" y="14140"/>
+                  </a:cubicBezTo>
+                  <a:cubicBezTo>
+                    <a:pt x="28814" y="15188"/>
+                    <a:pt x="28730" y="16223"/>
+                    <a:pt x="28480" y="17152"/>
+                  </a:cubicBezTo>
+                  <a:cubicBezTo>
+                    <a:pt x="28385" y="17485"/>
+                    <a:pt x="28278" y="17747"/>
+                    <a:pt x="28159" y="17974"/>
+                  </a:cubicBezTo>
+                  <a:cubicBezTo>
+                    <a:pt x="27611" y="17950"/>
+                    <a:pt x="27254" y="17819"/>
+                    <a:pt x="27064" y="17593"/>
+                  </a:cubicBezTo>
+                  <a:cubicBezTo>
+                    <a:pt x="26873" y="17354"/>
+                    <a:pt x="26837" y="16985"/>
+                    <a:pt x="26956" y="16473"/>
+                  </a:cubicBezTo>
+                  <a:cubicBezTo>
+                    <a:pt x="27004" y="16247"/>
+                    <a:pt x="27075" y="16033"/>
+                    <a:pt x="27159" y="15807"/>
+                  </a:cubicBezTo>
+                  <a:cubicBezTo>
+                    <a:pt x="27278" y="15473"/>
+                    <a:pt x="27397" y="15128"/>
+                    <a:pt x="27445" y="14735"/>
+                  </a:cubicBezTo>
+                  <a:cubicBezTo>
+                    <a:pt x="27492" y="14342"/>
+                    <a:pt x="27456" y="13949"/>
+                    <a:pt x="27409" y="13580"/>
+                  </a:cubicBezTo>
+                  <a:close/>
+                  <a:moveTo>
+                    <a:pt x="24147" y="12771"/>
+                  </a:moveTo>
+                  <a:lnTo>
+                    <a:pt x="24147" y="12771"/>
+                  </a:lnTo>
+                  <a:cubicBezTo>
+                    <a:pt x="24623" y="12818"/>
+                    <a:pt x="25099" y="12902"/>
+                    <a:pt x="25575" y="13021"/>
+                  </a:cubicBezTo>
+                  <a:cubicBezTo>
+                    <a:pt x="25575" y="13199"/>
+                    <a:pt x="25563" y="13390"/>
+                    <a:pt x="25551" y="13580"/>
+                  </a:cubicBezTo>
+                  <a:cubicBezTo>
+                    <a:pt x="25528" y="13914"/>
+                    <a:pt x="25516" y="14259"/>
+                    <a:pt x="25528" y="14616"/>
+                  </a:cubicBezTo>
+                  <a:cubicBezTo>
+                    <a:pt x="25551" y="15247"/>
+                    <a:pt x="25718" y="15938"/>
+                    <a:pt x="26659" y="16021"/>
+                  </a:cubicBezTo>
+                  <a:cubicBezTo>
+                    <a:pt x="26611" y="16140"/>
+                    <a:pt x="26587" y="16259"/>
+                    <a:pt x="26552" y="16378"/>
+                  </a:cubicBezTo>
+                  <a:cubicBezTo>
+                    <a:pt x="26409" y="17033"/>
+                    <a:pt x="26480" y="17509"/>
+                    <a:pt x="26754" y="17843"/>
+                  </a:cubicBezTo>
+                  <a:cubicBezTo>
+                    <a:pt x="26992" y="18140"/>
+                    <a:pt x="27361" y="18307"/>
+                    <a:pt x="27921" y="18366"/>
+                  </a:cubicBezTo>
+                  <a:cubicBezTo>
+                    <a:pt x="27754" y="18605"/>
+                    <a:pt x="27564" y="18807"/>
+                    <a:pt x="27361" y="19021"/>
+                  </a:cubicBezTo>
+                  <a:cubicBezTo>
+                    <a:pt x="27111" y="19307"/>
+                    <a:pt x="26849" y="19593"/>
+                    <a:pt x="26587" y="19974"/>
+                  </a:cubicBezTo>
+                  <a:cubicBezTo>
+                    <a:pt x="26575" y="19998"/>
+                    <a:pt x="26564" y="20010"/>
+                    <a:pt x="26552" y="20033"/>
+                  </a:cubicBezTo>
+                  <a:cubicBezTo>
+                    <a:pt x="26538" y="20031"/>
+                    <a:pt x="26524" y="20029"/>
+                    <a:pt x="26510" y="20029"/>
+                  </a:cubicBezTo>
+                  <a:cubicBezTo>
+                    <a:pt x="26461" y="20029"/>
+                    <a:pt x="26410" y="20047"/>
+                    <a:pt x="26373" y="20093"/>
+                  </a:cubicBezTo>
+                  <a:cubicBezTo>
+                    <a:pt x="26244" y="20222"/>
+                    <a:pt x="26077" y="20289"/>
+                    <a:pt x="25873" y="20289"/>
+                  </a:cubicBezTo>
+                  <a:cubicBezTo>
+                    <a:pt x="25795" y="20289"/>
+                    <a:pt x="25712" y="20279"/>
+                    <a:pt x="25623" y="20260"/>
+                  </a:cubicBezTo>
+                  <a:cubicBezTo>
+                    <a:pt x="24932" y="20105"/>
+                    <a:pt x="24194" y="19414"/>
+                    <a:pt x="24051" y="18938"/>
+                  </a:cubicBezTo>
+                  <a:cubicBezTo>
+                    <a:pt x="23885" y="18414"/>
+                    <a:pt x="24004" y="17866"/>
+                    <a:pt x="24123" y="17271"/>
+                  </a:cubicBezTo>
+                  <a:cubicBezTo>
+                    <a:pt x="24194" y="16962"/>
+                    <a:pt x="24254" y="16640"/>
+                    <a:pt x="24278" y="16319"/>
+                  </a:cubicBezTo>
+                  <a:cubicBezTo>
+                    <a:pt x="24349" y="15366"/>
+                    <a:pt x="24385" y="13949"/>
+                    <a:pt x="24147" y="12771"/>
+                  </a:cubicBezTo>
+                  <a:close/>
+                  <a:moveTo>
+                    <a:pt x="18301" y="14759"/>
+                  </a:moveTo>
+                  <a:cubicBezTo>
+                    <a:pt x="18312" y="15342"/>
+                    <a:pt x="18420" y="15914"/>
+                    <a:pt x="18622" y="16366"/>
+                  </a:cubicBezTo>
+                  <a:cubicBezTo>
+                    <a:pt x="18777" y="16688"/>
+                    <a:pt x="19003" y="16962"/>
+                    <a:pt x="19217" y="17223"/>
+                  </a:cubicBezTo>
+                  <a:cubicBezTo>
+                    <a:pt x="19313" y="17331"/>
+                    <a:pt x="19396" y="17438"/>
+                    <a:pt x="19479" y="17557"/>
+                  </a:cubicBezTo>
+                  <a:cubicBezTo>
+                    <a:pt x="19479" y="17581"/>
+                    <a:pt x="19479" y="17616"/>
+                    <a:pt x="19491" y="17640"/>
+                  </a:cubicBezTo>
+                  <a:cubicBezTo>
+                    <a:pt x="19503" y="17700"/>
+                    <a:pt x="19563" y="17735"/>
+                    <a:pt x="19622" y="17759"/>
+                  </a:cubicBezTo>
+                  <a:cubicBezTo>
+                    <a:pt x="19717" y="17914"/>
+                    <a:pt x="19801" y="18069"/>
+                    <a:pt x="19848" y="18236"/>
+                  </a:cubicBezTo>
+                  <a:cubicBezTo>
+                    <a:pt x="19944" y="18628"/>
+                    <a:pt x="19884" y="18998"/>
+                    <a:pt x="19646" y="19367"/>
+                  </a:cubicBezTo>
+                  <a:cubicBezTo>
+                    <a:pt x="19325" y="19867"/>
+                    <a:pt x="18682" y="20271"/>
+                    <a:pt x="18039" y="20402"/>
+                  </a:cubicBezTo>
+                  <a:cubicBezTo>
+                    <a:pt x="17848" y="20283"/>
+                    <a:pt x="17670" y="20141"/>
+                    <a:pt x="17479" y="19962"/>
+                  </a:cubicBezTo>
+                  <a:cubicBezTo>
+                    <a:pt x="17110" y="19605"/>
+                    <a:pt x="16598" y="18164"/>
+                    <a:pt x="16265" y="16676"/>
+                  </a:cubicBezTo>
+                  <a:cubicBezTo>
+                    <a:pt x="16788" y="16152"/>
+                    <a:pt x="17324" y="15628"/>
+                    <a:pt x="17860" y="15140"/>
+                  </a:cubicBezTo>
+                  <a:cubicBezTo>
+                    <a:pt x="18003" y="15009"/>
+                    <a:pt x="18158" y="14878"/>
+                    <a:pt x="18301" y="14759"/>
+                  </a:cubicBezTo>
+                  <a:close/>
+                  <a:moveTo>
+                    <a:pt x="29266" y="14306"/>
+                  </a:moveTo>
+                  <a:cubicBezTo>
+                    <a:pt x="29742" y="14509"/>
+                    <a:pt x="30231" y="14711"/>
+                    <a:pt x="30731" y="14926"/>
+                  </a:cubicBezTo>
+                  <a:cubicBezTo>
+                    <a:pt x="30778" y="14937"/>
+                    <a:pt x="30826" y="14961"/>
+                    <a:pt x="30874" y="14973"/>
+                  </a:cubicBezTo>
+                  <a:cubicBezTo>
+                    <a:pt x="30433" y="15664"/>
+                    <a:pt x="30052" y="16426"/>
+                    <a:pt x="29778" y="17223"/>
+                  </a:cubicBezTo>
+                  <a:cubicBezTo>
+                    <a:pt x="29314" y="18569"/>
+                    <a:pt x="28814" y="19831"/>
+                    <a:pt x="27718" y="20533"/>
+                  </a:cubicBezTo>
+                  <a:cubicBezTo>
+                    <a:pt x="27606" y="20601"/>
+                    <a:pt x="27494" y="20689"/>
+                    <a:pt x="27362" y="20689"/>
+                  </a:cubicBezTo>
+                  <a:cubicBezTo>
+                    <a:pt x="27354" y="20689"/>
+                    <a:pt x="27346" y="20689"/>
+                    <a:pt x="27337" y="20688"/>
+                  </a:cubicBezTo>
+                  <a:cubicBezTo>
+                    <a:pt x="27135" y="20688"/>
+                    <a:pt x="26968" y="20486"/>
+                    <a:pt x="26873" y="20283"/>
+                  </a:cubicBezTo>
+                  <a:cubicBezTo>
+                    <a:pt x="26897" y="20260"/>
+                    <a:pt x="26909" y="20236"/>
+                    <a:pt x="26921" y="20212"/>
+                  </a:cubicBezTo>
+                  <a:cubicBezTo>
+                    <a:pt x="27171" y="19843"/>
+                    <a:pt x="27421" y="19569"/>
+                    <a:pt x="27671" y="19295"/>
+                  </a:cubicBezTo>
+                  <a:cubicBezTo>
+                    <a:pt x="27921" y="19021"/>
+                    <a:pt x="28171" y="18747"/>
+                    <a:pt x="28397" y="18390"/>
+                  </a:cubicBezTo>
+                  <a:lnTo>
+                    <a:pt x="28469" y="18390"/>
+                  </a:lnTo>
+                  <a:cubicBezTo>
+                    <a:pt x="28588" y="18390"/>
+                    <a:pt x="28671" y="18295"/>
+                    <a:pt x="28671" y="18176"/>
+                  </a:cubicBezTo>
+                  <a:cubicBezTo>
+                    <a:pt x="28671" y="18116"/>
+                    <a:pt x="28635" y="18057"/>
+                    <a:pt x="28588" y="18021"/>
+                  </a:cubicBezTo>
+                  <a:cubicBezTo>
+                    <a:pt x="28695" y="17807"/>
+                    <a:pt x="28790" y="17557"/>
+                    <a:pt x="28873" y="17259"/>
+                  </a:cubicBezTo>
+                  <a:cubicBezTo>
+                    <a:pt x="29123" y="16331"/>
+                    <a:pt x="29207" y="15318"/>
+                    <a:pt x="29266" y="14306"/>
+                  </a:cubicBezTo>
+                  <a:close/>
+                  <a:moveTo>
+                    <a:pt x="15919" y="17045"/>
+                  </a:moveTo>
+                  <a:cubicBezTo>
+                    <a:pt x="16265" y="18497"/>
+                    <a:pt x="16777" y="19867"/>
+                    <a:pt x="17205" y="20260"/>
+                  </a:cubicBezTo>
+                  <a:cubicBezTo>
+                    <a:pt x="17384" y="20438"/>
+                    <a:pt x="17562" y="20581"/>
+                    <a:pt x="17753" y="20712"/>
+                  </a:cubicBezTo>
+                  <a:cubicBezTo>
+                    <a:pt x="17789" y="20783"/>
+                    <a:pt x="17860" y="20843"/>
+                    <a:pt x="17943" y="20843"/>
+                  </a:cubicBezTo>
+                  <a:lnTo>
+                    <a:pt x="17955" y="20843"/>
+                  </a:lnTo>
+                  <a:cubicBezTo>
+                    <a:pt x="18384" y="21105"/>
+                    <a:pt x="18836" y="21272"/>
+                    <a:pt x="19301" y="21379"/>
+                  </a:cubicBezTo>
+                  <a:cubicBezTo>
+                    <a:pt x="18920" y="21700"/>
+                    <a:pt x="18581" y="21860"/>
+                    <a:pt x="18270" y="21860"/>
+                  </a:cubicBezTo>
+                  <a:cubicBezTo>
+                    <a:pt x="18212" y="21860"/>
+                    <a:pt x="18155" y="21854"/>
+                    <a:pt x="18098" y="21843"/>
+                  </a:cubicBezTo>
+                  <a:cubicBezTo>
+                    <a:pt x="17289" y="21700"/>
+                    <a:pt x="16717" y="20438"/>
+                    <a:pt x="16157" y="19224"/>
+                  </a:cubicBezTo>
+                  <a:cubicBezTo>
+                    <a:pt x="15896" y="18640"/>
+                    <a:pt x="15634" y="18081"/>
+                    <a:pt x="15348" y="17628"/>
+                  </a:cubicBezTo>
+                  <a:cubicBezTo>
+                    <a:pt x="15538" y="17426"/>
+                    <a:pt x="15729" y="17235"/>
+                    <a:pt x="15919" y="17045"/>
+                  </a:cubicBezTo>
+                  <a:close/>
+                  <a:moveTo>
+                    <a:pt x="23358" y="12738"/>
+                  </a:moveTo>
+                  <a:cubicBezTo>
+                    <a:pt x="23478" y="12738"/>
+                    <a:pt x="23598" y="12741"/>
+                    <a:pt x="23718" y="12747"/>
+                  </a:cubicBezTo>
+                  <a:cubicBezTo>
+                    <a:pt x="23992" y="14021"/>
+                    <a:pt x="23920" y="15664"/>
+                    <a:pt x="23873" y="16295"/>
+                  </a:cubicBezTo>
+                  <a:cubicBezTo>
+                    <a:pt x="23849" y="16581"/>
+                    <a:pt x="23789" y="16878"/>
+                    <a:pt x="23730" y="17188"/>
+                  </a:cubicBezTo>
+                  <a:cubicBezTo>
+                    <a:pt x="23599" y="17807"/>
+                    <a:pt x="23468" y="18438"/>
+                    <a:pt x="23658" y="19057"/>
+                  </a:cubicBezTo>
+                  <a:cubicBezTo>
+                    <a:pt x="23861" y="19724"/>
+                    <a:pt x="24754" y="20486"/>
+                    <a:pt x="25528" y="20664"/>
+                  </a:cubicBezTo>
+                  <a:cubicBezTo>
+                    <a:pt x="25659" y="20688"/>
+                    <a:pt x="25766" y="20700"/>
+                    <a:pt x="25885" y="20700"/>
+                  </a:cubicBezTo>
+                  <a:cubicBezTo>
+                    <a:pt x="25980" y="20700"/>
+                    <a:pt x="26075" y="20688"/>
+                    <a:pt x="26171" y="20664"/>
+                  </a:cubicBezTo>
+                  <a:lnTo>
+                    <a:pt x="26171" y="20664"/>
+                  </a:lnTo>
+                  <a:cubicBezTo>
+                    <a:pt x="25778" y="21403"/>
+                    <a:pt x="25635" y="21998"/>
+                    <a:pt x="25599" y="22605"/>
+                  </a:cubicBezTo>
+                  <a:cubicBezTo>
+                    <a:pt x="25528" y="22641"/>
+                    <a:pt x="25480" y="22700"/>
+                    <a:pt x="25468" y="22772"/>
+                  </a:cubicBezTo>
+                  <a:cubicBezTo>
+                    <a:pt x="25051" y="21795"/>
+                    <a:pt x="24206" y="21355"/>
+                    <a:pt x="22003" y="21236"/>
+                  </a:cubicBezTo>
+                  <a:cubicBezTo>
+                    <a:pt x="21825" y="21224"/>
+                    <a:pt x="21634" y="21212"/>
+                    <a:pt x="21456" y="21212"/>
+                  </a:cubicBezTo>
+                  <a:cubicBezTo>
+                    <a:pt x="20396" y="21164"/>
+                    <a:pt x="19432" y="21117"/>
+                    <a:pt x="18539" y="20688"/>
+                  </a:cubicBezTo>
+                  <a:cubicBezTo>
+                    <a:pt x="19134" y="20474"/>
+                    <a:pt x="19670" y="20081"/>
+                    <a:pt x="19991" y="19593"/>
+                  </a:cubicBezTo>
+                  <a:cubicBezTo>
+                    <a:pt x="20289" y="19128"/>
+                    <a:pt x="20372" y="18628"/>
+                    <a:pt x="20241" y="18128"/>
+                  </a:cubicBezTo>
+                  <a:cubicBezTo>
+                    <a:pt x="20182" y="17950"/>
+                    <a:pt x="20110" y="17783"/>
+                    <a:pt x="20015" y="17628"/>
+                  </a:cubicBezTo>
+                  <a:cubicBezTo>
+                    <a:pt x="20122" y="17557"/>
+                    <a:pt x="20194" y="17474"/>
+                    <a:pt x="20241" y="17366"/>
+                  </a:cubicBezTo>
+                  <a:cubicBezTo>
+                    <a:pt x="20372" y="17093"/>
+                    <a:pt x="20253" y="16795"/>
+                    <a:pt x="20146" y="16521"/>
+                  </a:cubicBezTo>
+                  <a:cubicBezTo>
+                    <a:pt x="20098" y="16390"/>
+                    <a:pt x="20039" y="16259"/>
+                    <a:pt x="20015" y="16152"/>
+                  </a:cubicBezTo>
+                  <a:cubicBezTo>
+                    <a:pt x="19825" y="15223"/>
+                    <a:pt x="19848" y="14414"/>
+                    <a:pt x="20003" y="13604"/>
+                  </a:cubicBezTo>
+                  <a:cubicBezTo>
+                    <a:pt x="21142" y="12992"/>
+                    <a:pt x="22252" y="12738"/>
+                    <a:pt x="23358" y="12738"/>
+                  </a:cubicBezTo>
+                  <a:close/>
+                  <a:moveTo>
+                    <a:pt x="35065" y="1"/>
+                  </a:moveTo>
+                  <a:cubicBezTo>
+                    <a:pt x="33061" y="1"/>
+                    <a:pt x="29825" y="4743"/>
+                    <a:pt x="27908" y="4743"/>
+                  </a:cubicBezTo>
+                  <a:cubicBezTo>
+                    <a:pt x="27835" y="4743"/>
+                    <a:pt x="27764" y="4736"/>
+                    <a:pt x="27695" y="4722"/>
+                  </a:cubicBezTo>
+                  <a:cubicBezTo>
+                    <a:pt x="25442" y="4255"/>
+                    <a:pt x="24493" y="1437"/>
+                    <a:pt x="22431" y="1437"/>
+                  </a:cubicBezTo>
+                  <a:cubicBezTo>
+                    <a:pt x="21811" y="1437"/>
+                    <a:pt x="21091" y="1691"/>
+                    <a:pt x="20206" y="2341"/>
+                  </a:cubicBezTo>
+                  <a:cubicBezTo>
+                    <a:pt x="17574" y="4281"/>
+                    <a:pt x="19682" y="7056"/>
+                    <a:pt x="18158" y="9068"/>
+                  </a:cubicBezTo>
+                  <a:cubicBezTo>
+                    <a:pt x="17682" y="9692"/>
+                    <a:pt x="16979" y="9932"/>
+                    <a:pt x="16137" y="9932"/>
+                  </a:cubicBezTo>
+                  <a:cubicBezTo>
+                    <a:pt x="13390" y="9932"/>
+                    <a:pt x="9163" y="7384"/>
+                    <a:pt x="6534" y="7384"/>
+                  </a:cubicBezTo>
+                  <a:cubicBezTo>
+                    <a:pt x="6299" y="7384"/>
+                    <a:pt x="6077" y="7404"/>
+                    <a:pt x="5870" y="7448"/>
+                  </a:cubicBezTo>
+                  <a:cubicBezTo>
+                    <a:pt x="203" y="8663"/>
+                    <a:pt x="1" y="16557"/>
+                    <a:pt x="3596" y="19890"/>
+                  </a:cubicBezTo>
+                  <a:cubicBezTo>
+                    <a:pt x="5319" y="21493"/>
+                    <a:pt x="6853" y="22130"/>
+                    <a:pt x="8267" y="22130"/>
+                  </a:cubicBezTo>
+                  <a:cubicBezTo>
+                    <a:pt x="10782" y="22130"/>
+                    <a:pt x="12916" y="20113"/>
+                    <a:pt x="15050" y="17926"/>
+                  </a:cubicBezTo>
+                  <a:cubicBezTo>
+                    <a:pt x="15312" y="18355"/>
+                    <a:pt x="15550" y="18878"/>
+                    <a:pt x="15788" y="19390"/>
+                  </a:cubicBezTo>
+                  <a:cubicBezTo>
+                    <a:pt x="16384" y="20700"/>
+                    <a:pt x="17015" y="22057"/>
+                    <a:pt x="18027" y="22248"/>
+                  </a:cubicBezTo>
+                  <a:cubicBezTo>
+                    <a:pt x="18098" y="22260"/>
+                    <a:pt x="18182" y="22272"/>
+                    <a:pt x="18265" y="22272"/>
+                  </a:cubicBezTo>
+                  <a:cubicBezTo>
+                    <a:pt x="18741" y="22272"/>
+                    <a:pt x="19241" y="22010"/>
+                    <a:pt x="19801" y="21486"/>
+                  </a:cubicBezTo>
+                  <a:cubicBezTo>
+                    <a:pt x="20325" y="21569"/>
+                    <a:pt x="20872" y="21593"/>
+                    <a:pt x="21432" y="21617"/>
+                  </a:cubicBezTo>
+                  <a:cubicBezTo>
+                    <a:pt x="21622" y="21629"/>
+                    <a:pt x="21801" y="21629"/>
+                    <a:pt x="21980" y="21641"/>
+                  </a:cubicBezTo>
+                  <a:cubicBezTo>
+                    <a:pt x="24944" y="21807"/>
+                    <a:pt x="25159" y="22379"/>
+                    <a:pt x="25456" y="24677"/>
+                  </a:cubicBezTo>
+                  <a:cubicBezTo>
+                    <a:pt x="25623" y="26058"/>
+                    <a:pt x="25456" y="27570"/>
+                    <a:pt x="25456" y="28951"/>
+                  </a:cubicBezTo>
+                  <a:cubicBezTo>
+                    <a:pt x="25456" y="31392"/>
+                    <a:pt x="25456" y="33821"/>
+                    <a:pt x="25456" y="36262"/>
+                  </a:cubicBezTo>
+                  <a:cubicBezTo>
+                    <a:pt x="25456" y="36440"/>
+                    <a:pt x="25504" y="36678"/>
+                    <a:pt x="25682" y="36690"/>
+                  </a:cubicBezTo>
+                  <a:cubicBezTo>
+                    <a:pt x="25687" y="36690"/>
+                    <a:pt x="25691" y="36691"/>
+                    <a:pt x="25696" y="36691"/>
+                  </a:cubicBezTo>
+                  <a:cubicBezTo>
+                    <a:pt x="25887" y="36691"/>
+                    <a:pt x="25944" y="36436"/>
+                    <a:pt x="25944" y="36250"/>
+                  </a:cubicBezTo>
+                  <a:cubicBezTo>
+                    <a:pt x="25956" y="33464"/>
+                    <a:pt x="25968" y="30666"/>
+                    <a:pt x="25980" y="27880"/>
+                  </a:cubicBezTo>
+                  <a:cubicBezTo>
+                    <a:pt x="25992" y="26487"/>
+                    <a:pt x="26016" y="25093"/>
+                    <a:pt x="26004" y="23700"/>
+                  </a:cubicBezTo>
+                  <a:cubicBezTo>
+                    <a:pt x="25992" y="22593"/>
+                    <a:pt x="26052" y="21665"/>
+                    <a:pt x="26635" y="20676"/>
+                  </a:cubicBezTo>
+                  <a:cubicBezTo>
+                    <a:pt x="26802" y="20903"/>
+                    <a:pt x="27028" y="21093"/>
+                    <a:pt x="27337" y="21093"/>
+                  </a:cubicBezTo>
+                  <a:cubicBezTo>
+                    <a:pt x="27576" y="21093"/>
+                    <a:pt x="27778" y="20986"/>
+                    <a:pt x="27945" y="20879"/>
+                  </a:cubicBezTo>
+                  <a:cubicBezTo>
+                    <a:pt x="29147" y="20105"/>
+                    <a:pt x="29683" y="18771"/>
+                    <a:pt x="30159" y="17366"/>
+                  </a:cubicBezTo>
+                  <a:cubicBezTo>
+                    <a:pt x="30445" y="16557"/>
+                    <a:pt x="30814" y="15807"/>
+                    <a:pt x="31266" y="15116"/>
+                  </a:cubicBezTo>
+                  <a:cubicBezTo>
+                    <a:pt x="32581" y="15594"/>
+                    <a:pt x="33923" y="15826"/>
+                    <a:pt x="35239" y="15826"/>
+                  </a:cubicBezTo>
+                  <a:cubicBezTo>
+                    <a:pt x="38680" y="15826"/>
+                    <a:pt x="41953" y="14239"/>
+                    <a:pt x="44149" y="11294"/>
+                  </a:cubicBezTo>
+                  <a:cubicBezTo>
+                    <a:pt x="48156" y="5945"/>
+                    <a:pt x="43939" y="1151"/>
+                    <a:pt x="38630" y="1151"/>
+                  </a:cubicBezTo>
+                  <a:cubicBezTo>
+                    <a:pt x="37912" y="1151"/>
+                    <a:pt x="37174" y="1238"/>
+                    <a:pt x="36434" y="1424"/>
+                  </a:cubicBezTo>
+                  <a:cubicBezTo>
+                    <a:pt x="36122" y="398"/>
+                    <a:pt x="35645" y="1"/>
+                    <a:pt x="35065" y="1"/>
+                  </a:cubicBezTo>
+                  <a:close/>
+                </a:path>
+              </a:pathLst>
+            </a:custGeom>
+            <a:solidFill>
+              <a:srgbClr val="053B5C"/>
+            </a:solidFill>
+            <a:ln>
+              <a:noFill/>
+            </a:ln>
+          </p:spPr>
+          <p:txBody>
+            <a:bodyPr spcFirstLastPara="1" wrap="square" lIns="91425" tIns="91425" rIns="91425" bIns="91425" anchor="ctr" anchorCtr="0">
+              <a:noAutofit/>
+            </a:bodyPr>
+            <a:lstStyle/>
+            <a:p>
+              <a:pPr marL="0" lvl="0" indent="0" algn="l" rtl="0">
+                <a:spcBef>
+                  <a:spcPts val="0"/>
+                </a:spcBef>
+                <a:spcAft>
+                  <a:spcPts val="0"/>
+                </a:spcAft>
+                <a:buNone/>
+              </a:pPr>
+              <a:endParaRPr/>
+            </a:p>
+          </p:txBody>
+        </p:sp>
+        <p:sp>
+          <p:nvSpPr>
+            <p:cNvPr id="306" name="Google Shape;306;p27"/>
+            <p:cNvSpPr/>
+            <p:nvPr/>
+          </p:nvSpPr>
+          <p:spPr>
+            <a:xfrm flipH="1">
+              <a:off x="5978544" y="4795819"/>
+              <a:ext cx="1347267" cy="343936"/>
+            </a:xfrm>
+            <a:custGeom>
+              <a:avLst/>
+              <a:gdLst/>
+              <a:ahLst/>
+              <a:cxnLst/>
+              <a:rect l="l" t="t" r="r" b="b"/>
+              <a:pathLst>
+                <a:path w="43054" h="10991" extrusionOk="0">
+                  <a:moveTo>
+                    <a:pt x="21920" y="1"/>
+                  </a:moveTo>
+                  <a:cubicBezTo>
+                    <a:pt x="19110" y="1"/>
+                    <a:pt x="16717" y="2084"/>
+                    <a:pt x="15753" y="5025"/>
+                  </a:cubicBezTo>
+                  <a:cubicBezTo>
+                    <a:pt x="14574" y="3882"/>
+                    <a:pt x="12967" y="3168"/>
+                    <a:pt x="11181" y="3168"/>
+                  </a:cubicBezTo>
+                  <a:cubicBezTo>
+                    <a:pt x="7954" y="3168"/>
+                    <a:pt x="5275" y="5502"/>
+                    <a:pt x="4739" y="8573"/>
+                  </a:cubicBezTo>
+                  <a:cubicBezTo>
+                    <a:pt x="4299" y="8359"/>
+                    <a:pt x="3811" y="8228"/>
+                    <a:pt x="3287" y="8228"/>
+                  </a:cubicBezTo>
+                  <a:cubicBezTo>
+                    <a:pt x="1644" y="8228"/>
+                    <a:pt x="275" y="9419"/>
+                    <a:pt x="1" y="10990"/>
+                  </a:cubicBezTo>
+                  <a:lnTo>
+                    <a:pt x="43054" y="10990"/>
+                  </a:lnTo>
+                  <a:cubicBezTo>
+                    <a:pt x="43054" y="10990"/>
+                    <a:pt x="43054" y="10990"/>
+                    <a:pt x="43054" y="10978"/>
+                  </a:cubicBezTo>
+                  <a:cubicBezTo>
+                    <a:pt x="43054" y="8407"/>
+                    <a:pt x="40970" y="6323"/>
+                    <a:pt x="38398" y="6323"/>
+                  </a:cubicBezTo>
+                  <a:cubicBezTo>
+                    <a:pt x="37744" y="6323"/>
+                    <a:pt x="37124" y="6454"/>
+                    <a:pt x="36565" y="6704"/>
+                  </a:cubicBezTo>
+                  <a:cubicBezTo>
+                    <a:pt x="35815" y="4025"/>
+                    <a:pt x="33374" y="2061"/>
+                    <a:pt x="30469" y="2061"/>
+                  </a:cubicBezTo>
+                  <a:cubicBezTo>
+                    <a:pt x="29231" y="2061"/>
+                    <a:pt x="28088" y="2418"/>
+                    <a:pt x="27123" y="3025"/>
+                  </a:cubicBezTo>
+                  <a:cubicBezTo>
+                    <a:pt x="25909" y="1191"/>
+                    <a:pt x="24028" y="1"/>
+                    <a:pt x="21920" y="1"/>
+                  </a:cubicBezTo>
+                  <a:close/>
+                </a:path>
+              </a:pathLst>
+            </a:custGeom>
+            <a:solidFill>
+              <a:srgbClr val="40B4E5"/>
+            </a:solidFill>
+            <a:ln>
+              <a:noFill/>
+            </a:ln>
+          </p:spPr>
+          <p:txBody>
+            <a:bodyPr spcFirstLastPara="1" wrap="square" lIns="91425" tIns="91425" rIns="91425" bIns="91425" anchor="ctr" anchorCtr="0">
+              <a:noAutofit/>
+            </a:bodyPr>
+            <a:lstStyle/>
+            <a:p>
+              <a:pPr marL="0" lvl="0" indent="0" algn="l" rtl="0">
+                <a:spcBef>
+                  <a:spcPts val="0"/>
+                </a:spcBef>
+                <a:spcAft>
+                  <a:spcPts val="0"/>
+                </a:spcAft>
+                <a:buNone/>
+              </a:pPr>
+              <a:endParaRPr/>
+            </a:p>
+          </p:txBody>
+        </p:sp>
+        <p:sp>
+          <p:nvSpPr>
+            <p:cNvPr id="307" name="Google Shape;307;p27"/>
+            <p:cNvSpPr/>
+            <p:nvPr/>
+          </p:nvSpPr>
+          <p:spPr>
+            <a:xfrm flipH="1">
+              <a:off x="7621797" y="4856501"/>
+              <a:ext cx="1109502" cy="283238"/>
+            </a:xfrm>
+            <a:custGeom>
+              <a:avLst/>
+              <a:gdLst/>
+              <a:ahLst/>
+              <a:cxnLst/>
+              <a:rect l="l" t="t" r="r" b="b"/>
+              <a:pathLst>
+                <a:path w="43054" h="10991" extrusionOk="0">
+                  <a:moveTo>
+                    <a:pt x="21920" y="1"/>
+                  </a:moveTo>
+                  <a:cubicBezTo>
+                    <a:pt x="19110" y="1"/>
+                    <a:pt x="16717" y="2084"/>
+                    <a:pt x="15753" y="5025"/>
+                  </a:cubicBezTo>
+                  <a:cubicBezTo>
+                    <a:pt x="14574" y="3882"/>
+                    <a:pt x="12967" y="3168"/>
+                    <a:pt x="11181" y="3168"/>
+                  </a:cubicBezTo>
+                  <a:cubicBezTo>
+                    <a:pt x="7954" y="3168"/>
+                    <a:pt x="5275" y="5502"/>
+                    <a:pt x="4739" y="8573"/>
+                  </a:cubicBezTo>
+                  <a:cubicBezTo>
+                    <a:pt x="4299" y="8359"/>
+                    <a:pt x="3811" y="8228"/>
+                    <a:pt x="3287" y="8228"/>
+                  </a:cubicBezTo>
+                  <a:cubicBezTo>
+                    <a:pt x="1644" y="8228"/>
+                    <a:pt x="275" y="9419"/>
+                    <a:pt x="1" y="10990"/>
+                  </a:cubicBezTo>
+                  <a:lnTo>
+                    <a:pt x="43054" y="10990"/>
+                  </a:lnTo>
+                  <a:cubicBezTo>
+                    <a:pt x="43054" y="10990"/>
+                    <a:pt x="43054" y="10990"/>
+                    <a:pt x="43054" y="10978"/>
+                  </a:cubicBezTo>
+                  <a:cubicBezTo>
+                    <a:pt x="43054" y="8407"/>
+                    <a:pt x="40970" y="6323"/>
+                    <a:pt x="38398" y="6323"/>
+                  </a:cubicBezTo>
+                  <a:cubicBezTo>
+                    <a:pt x="37744" y="6323"/>
+                    <a:pt x="37124" y="6454"/>
+                    <a:pt x="36565" y="6704"/>
+                  </a:cubicBezTo>
+                  <a:cubicBezTo>
+                    <a:pt x="35815" y="4025"/>
+                    <a:pt x="33374" y="2061"/>
+                    <a:pt x="30469" y="2061"/>
+                  </a:cubicBezTo>
+                  <a:cubicBezTo>
+                    <a:pt x="29231" y="2061"/>
+                    <a:pt x="28088" y="2418"/>
+                    <a:pt x="27123" y="3025"/>
+                  </a:cubicBezTo>
+                  <a:cubicBezTo>
+                    <a:pt x="25909" y="1191"/>
+                    <a:pt x="24028" y="1"/>
+                    <a:pt x="21920" y="1"/>
+                  </a:cubicBezTo>
+                  <a:close/>
+                </a:path>
+              </a:pathLst>
+            </a:custGeom>
+            <a:solidFill>
+              <a:srgbClr val="40B4E5"/>
+            </a:solidFill>
+            <a:ln>
+              <a:noFill/>
+            </a:ln>
+          </p:spPr>
+          <p:txBody>
+            <a:bodyPr spcFirstLastPara="1" wrap="square" lIns="91425" tIns="91425" rIns="91425" bIns="91425" anchor="ctr" anchorCtr="0">
+              <a:noAutofit/>
+            </a:bodyPr>
+            <a:lstStyle/>
+            <a:p>
+              <a:pPr marL="0" lvl="0" indent="0" algn="l" rtl="0">
+                <a:spcBef>
+                  <a:spcPts val="0"/>
+                </a:spcBef>
+                <a:spcAft>
+                  <a:spcPts val="0"/>
+                </a:spcAft>
+                <a:buNone/>
+              </a:pPr>
+              <a:endParaRPr/>
+            </a:p>
+          </p:txBody>
+        </p:sp>
+      </p:grpSp>
+      <p:sp>
+        <p:nvSpPr>
+          <p:cNvPr id="5" name="Text Placeholder 4">
+            <a:extLst>
+              <a:ext uri="{FF2B5EF4-FFF2-40B4-BE49-F238E27FC236}">
+                <a16:creationId xmlns:a16="http://schemas.microsoft.com/office/drawing/2014/main" id="{078ED1F0-F7D7-45CF-AD0A-0B379E8D0AC8}"/>
+              </a:ext>
+            </a:extLst>
+          </p:cNvPr>
+          <p:cNvSpPr>
+            <a:spLocks noGrp="1"/>
+          </p:cNvSpPr>
+          <p:nvPr>
+            <p:ph type="body" sz="quarter" idx="11"/>
+          </p:nvPr>
+        </p:nvSpPr>
+        <p:spPr>
+          <a:xfrm>
+            <a:off x="6985861" y="777875"/>
+            <a:ext cx="2027964" cy="3032125"/>
+          </a:xfrm>
+        </p:spPr>
+        <p:txBody>
+          <a:bodyPr/>
+          <a:lstStyle>
+            <a:lvl1pPr>
+              <a:defRPr sz="1200"/>
+            </a:lvl1pPr>
+            <a:lvl2pPr>
+              <a:defRPr sz="1200"/>
+            </a:lvl2pPr>
+            <a:lvl3pPr>
+              <a:defRPr sz="1200"/>
+            </a:lvl3pPr>
+            <a:lvl4pPr>
+              <a:defRPr sz="1200"/>
+            </a:lvl4pPr>
+            <a:lvl5pPr>
+              <a:defRPr sz="1200"/>
+            </a:lvl5pPr>
+          </a:lstStyle>
+          <a:p>
+            <a:pPr lvl="0"/>
+            <a:r>
+              <a:rPr lang="en-US"/>
+              <a:t>Click to edit Master text styles</a:t>
+            </a:r>
+          </a:p>
+          <a:p>
+            <a:pPr lvl="1"/>
+            <a:r>
+              <a:rPr lang="en-US"/>
+              <a:t>Second level</a:t>
+            </a:r>
+          </a:p>
+          <a:p>
+            <a:pPr lvl="2"/>
+            <a:r>
+              <a:rPr lang="en-US"/>
+              <a:t>Third level</a:t>
+            </a:r>
+          </a:p>
+          <a:p>
+            <a:pPr lvl="3"/>
+            <a:r>
+              <a:rPr lang="en-US"/>
+              <a:t>Fourth level</a:t>
+            </a:r>
+          </a:p>
+          <a:p>
+            <a:pPr lvl="4"/>
+            <a:r>
+              <a:rPr lang="en-US"/>
+              <a:t>Fifth level</a:t>
+            </a:r>
+          </a:p>
+        </p:txBody>
+      </p:sp>
+      <p:sp>
+        <p:nvSpPr>
+          <p:cNvPr id="4" name="Table Placeholder 3">
+            <a:extLst>
+              <a:ext uri="{FF2B5EF4-FFF2-40B4-BE49-F238E27FC236}">
+                <a16:creationId xmlns:a16="http://schemas.microsoft.com/office/drawing/2014/main" id="{A3980C78-CBC5-4CD4-BEBA-3B0DBBC36EBE}"/>
+              </a:ext>
+            </a:extLst>
+          </p:cNvPr>
+          <p:cNvSpPr>
+            <a:spLocks noGrp="1"/>
+          </p:cNvSpPr>
+          <p:nvPr>
+            <p:ph type="tbl" sz="quarter" idx="12"/>
+          </p:nvPr>
+        </p:nvSpPr>
+        <p:spPr>
+          <a:xfrm>
+            <a:off x="130175" y="777875"/>
+            <a:ext cx="6673581" cy="3819525"/>
+          </a:xfrm>
+        </p:spPr>
+        <p:txBody>
+          <a:bodyPr/>
+          <a:lstStyle/>
+          <a:p>
+            <a:endParaRPr lang="en-US"/>
+          </a:p>
+        </p:txBody>
+      </p:sp>
+    </p:spTree>
+    <p:extLst>
+      <p:ext uri="{BB962C8B-B14F-4D97-AF65-F5344CB8AC3E}">
+        <p14:creationId xmlns:p14="http://schemas.microsoft.com/office/powerpoint/2010/main" val="2250001514"/>
+      </p:ext>
+    </p:extLst>
+  </p:cSld>
+  <p:clrMapOvr>
+    <a:masterClrMapping/>
+  </p:clrMapOvr>
+</p:sldLayout>
+</file>
+
+<file path=ppt/slideLayouts/slideLayout4.xml><?xml version="1.0" encoding="utf-8"?>
 <p:sldLayout xmlns:a="http://schemas.openxmlformats.org/drawingml/2006/main" xmlns:r="http://schemas.openxmlformats.org/officeDocument/2006/relationships" xmlns:p="http://schemas.openxmlformats.org/presentationml/2006/main" matchingName="Caption">
   <p:cSld name="CAPTION_ONLY">
     <p:spTree>
@@ -2897,7 +4338,7 @@
 </p:sldLayout>
 </file>
 
-<file path=ppt/slideLayouts/slideLayout4.xml><?xml version="1.0" encoding="utf-8"?>
+<file path=ppt/slideLayouts/slideLayout5.xml><?xml version="1.0" encoding="utf-8"?>
 <p:sldLayout xmlns:a="http://schemas.openxmlformats.org/drawingml/2006/main" xmlns:r="http://schemas.openxmlformats.org/officeDocument/2006/relationships" xmlns:p="http://schemas.openxmlformats.org/presentationml/2006/main" matchingName="Blank" type="blank">
   <p:cSld name="BLANK">
     <p:spTree>
@@ -2922,7 +4363,7 @@
 </p:sldLayout>
 </file>
 
-<file path=ppt/slideLayouts/slideLayout5.xml><?xml version="1.0" encoding="utf-8"?>
+<file path=ppt/slideLayouts/slideLayout6.xml><?xml version="1.0" encoding="utf-8"?>
 <p:sldLayout xmlns:a="http://schemas.openxmlformats.org/drawingml/2006/main" xmlns:r="http://schemas.openxmlformats.org/officeDocument/2006/relationships" xmlns:p="http://schemas.openxmlformats.org/presentationml/2006/main" matchingName="Background">
   <p:cSld name="CUSTOM_16">
     <p:bg>
@@ -3495,9 +4936,10 @@
   <p:sldLayoutIdLst>
     <p:sldLayoutId id="2147483673" r:id="rId1"/>
     <p:sldLayoutId id="2147483648" r:id="rId2"/>
-    <p:sldLayoutId id="2147483656" r:id="rId3"/>
-    <p:sldLayoutId id="2147483658" r:id="rId4"/>
-    <p:sldLayoutId id="2147483675" r:id="rId5"/>
+    <p:sldLayoutId id="2147483678" r:id="rId3"/>
+    <p:sldLayoutId id="2147483656" r:id="rId4"/>
+    <p:sldLayoutId id="2147483658" r:id="rId5"/>
+    <p:sldLayoutId id="2147483675" r:id="rId6"/>
   </p:sldLayoutIdLst>
   <p:hf sldNum="0" hdr="0" ftr="0" dt="0"/>
   <p:txStyles>
@@ -18697,6 +20139,85 @@
 </p:sld>
 </file>
 
+<file path=ppt/slides/slide10.xml><?xml version="1.0" encoding="utf-8"?>
+<p:sld xmlns:a="http://schemas.openxmlformats.org/drawingml/2006/main" xmlns:p="http://schemas.openxmlformats.org/presentationml/2006/main" xmlns:r="http://schemas.openxmlformats.org/officeDocument/2006/relationships">
+  <p:cSld>
+    <p:spTree>
+      <p:nvGrpSpPr>
+        <p:cNvPr id="1" name=""/>
+        <p:cNvGrpSpPr/>
+        <p:nvPr/>
+      </p:nvGrpSpPr>
+      <p:grpSpPr/>
+      <p:sp>
+        <p:nvSpPr>
+          <p:cNvPr id="2" name="Title 1"/>
+          <p:cNvSpPr>
+            <a:spLocks noGrp="1"/>
+          </p:cNvSpPr>
+          <p:nvPr>
+            <p:ph type="title"/>
+          </p:nvPr>
+        </p:nvSpPr>
+        <p:spPr/>
+        <p:txBody>
+          <a:bodyPr/>
+          <a:lstStyle/>
+          <a:p>
+            <a:r>
+              <a:t>Facet Filled Line with Color Grouping</a:t>
+            </a:r>
+          </a:p>
+        </p:txBody>
+      </p:sp>
+      <p:pic>
+        <p:nvPicPr>
+          <p:cNvPr id="3" name="Picture Placeholder 2" descr="chart7.png"/>
+          <p:cNvPicPr>
+            <a:picLocks noGrp="1" noChangeAspect="1"/>
+          </p:cNvPicPr>
+          <p:nvPr>
+            <p:ph type="pic" idx="10" sz="quarter"/>
+          </p:nvPr>
+        </p:nvPicPr>
+        <p:blipFill>
+          <a:blip r:embed="rId2"/>
+          <a:srcRect l="1001" r="1001"/>
+          <a:stretch>
+            <a:fillRect/>
+          </a:stretch>
+        </p:blipFill>
+        <p:spPr/>
+      </p:pic>
+      <p:sp>
+        <p:nvSpPr>
+          <p:cNvPr id="4" name="Text Placeholder 3"/>
+          <p:cNvSpPr>
+            <a:spLocks noGrp="1"/>
+          </p:cNvSpPr>
+          <p:nvPr>
+            <p:ph type="body" idx="11" sz="quarter"/>
+          </p:nvPr>
+        </p:nvSpPr>
+        <p:spPr/>
+        <p:txBody>
+          <a:bodyPr/>
+          <a:lstStyle/>
+          <a:p>
+            <a:r>
+              <a:t>Grouping by additional variables is easy</a:t>
+            </a:r>
+          </a:p>
+        </p:txBody>
+      </p:sp>
+    </p:spTree>
+  </p:cSld>
+  <p:clrMapOvr>
+    <a:masterClrMapping/>
+  </p:clrMapOvr>
+</p:sld>
+</file>
+
 <file path=ppt/slides/slide2.xml><?xml version="1.0" encoding="utf-8"?>
 <p:sld xmlns:a="http://schemas.openxmlformats.org/drawingml/2006/main" xmlns:r="http://schemas.openxmlformats.org/officeDocument/2006/relationships" xmlns:p="http://schemas.openxmlformats.org/presentationml/2006/main">
   <p:cSld>
@@ -18802,7 +20323,7 @@
 </file>
 
 <file path=ppt/slides/slide3.xml><?xml version="1.0" encoding="utf-8"?>
-<p:sld xmlns:a="http://schemas.openxmlformats.org/drawingml/2006/main" xmlns:r="http://schemas.openxmlformats.org/officeDocument/2006/relationships" xmlns:p="http://schemas.openxmlformats.org/presentationml/2006/main">
+<p:sld xmlns:a="http://schemas.openxmlformats.org/drawingml/2006/main" xmlns:p="http://schemas.openxmlformats.org/presentationml/2006/main" xmlns:r="http://schemas.openxmlformats.org/officeDocument/2006/relationships">
   <p:cSld>
     <p:spTree>
       <p:nvGrpSpPr>
@@ -18810,14 +20331,7 @@
         <p:cNvGrpSpPr/>
         <p:nvPr/>
       </p:nvGrpSpPr>
-      <p:grpSpPr>
-        <a:xfrm>
-          <a:off x="0" y="0"/>
-          <a:ext cx="0" cy="0"/>
-          <a:chOff x="0" y="0"/>
-          <a:chExt cx="0" cy="0"/>
-        </a:xfrm>
-      </p:grpSpPr>
+      <p:grpSpPr/>
       <p:sp>
         <p:nvSpPr>
           <p:cNvPr id="2" name="Title 1"/>
@@ -18841,12 +20355,12 @@
       </p:sp>
       <p:pic>
         <p:nvPicPr>
-          <p:cNvPr id="3" name="Picture Placeholder 2" descr="stock-prices-by-company.png"/>
+          <p:cNvPr id="3" name="Picture Placeholder 2" descr="chart0.png"/>
           <p:cNvPicPr>
             <a:picLocks noGrp="1" noChangeAspect="1"/>
           </p:cNvPicPr>
           <p:nvPr>
-            <p:ph type="pic" sz="quarter" idx="10"/>
+            <p:ph type="pic" idx="10" sz="quarter"/>
           </p:nvPr>
         </p:nvPicPr>
         <p:blipFill>
@@ -18865,7 +20379,7 @@
             <a:spLocks noGrp="1"/>
           </p:cNvSpPr>
           <p:nvPr>
-            <p:ph type="body" sz="quarter" idx="11"/>
+            <p:ph type="body" idx="11" sz="quarter"/>
           </p:nvPr>
         </p:nvSpPr>
         <p:spPr/>
@@ -18888,7 +20402,7 @@
 </file>
 
 <file path=ppt/slides/slide4.xml><?xml version="1.0" encoding="utf-8"?>
-<p:sld xmlns:a="http://schemas.openxmlformats.org/drawingml/2006/main" xmlns:r="http://schemas.openxmlformats.org/officeDocument/2006/relationships" xmlns:p="http://schemas.openxmlformats.org/presentationml/2006/main">
+<p:sld xmlns:a="http://schemas.openxmlformats.org/drawingml/2006/main" xmlns:p="http://schemas.openxmlformats.org/presentationml/2006/main" xmlns:r="http://schemas.openxmlformats.org/officeDocument/2006/relationships">
   <p:cSld>
     <p:spTree>
       <p:nvGrpSpPr>
@@ -18896,14 +20410,7 @@
         <p:cNvGrpSpPr/>
         <p:nvPr/>
       </p:nvGrpSpPr>
-      <p:grpSpPr>
-        <a:xfrm>
-          <a:off x="0" y="0"/>
-          <a:ext cx="0" cy="0"/>
-          <a:chOff x="0" y="0"/>
-          <a:chExt cx="0" cy="0"/>
-        </a:xfrm>
-      </p:grpSpPr>
+      <p:grpSpPr/>
       <p:sp>
         <p:nvSpPr>
           <p:cNvPr id="2" name="Title 1"/>
@@ -18927,12 +20434,12 @@
       </p:sp>
       <p:pic>
         <p:nvPicPr>
-          <p:cNvPr id="3" name="Picture Placeholder 2" descr="spray-by-type.png"/>
+          <p:cNvPr id="3" name="Picture Placeholder 2" descr="chart1.png"/>
           <p:cNvPicPr>
             <a:picLocks noGrp="1" noChangeAspect="1"/>
           </p:cNvPicPr>
           <p:nvPr>
-            <p:ph type="pic" sz="quarter" idx="10"/>
+            <p:ph type="pic" idx="10" sz="quarter"/>
           </p:nvPr>
         </p:nvPicPr>
         <p:blipFill>
@@ -18951,7 +20458,7 @@
             <a:spLocks noGrp="1"/>
           </p:cNvSpPr>
           <p:nvPr>
-            <p:ph type="body" sz="quarter" idx="11"/>
+            <p:ph type="body" idx="11" sz="quarter"/>
           </p:nvPr>
         </p:nvSpPr>
         <p:spPr/>
@@ -18974,7 +20481,7 @@
 </file>
 
 <file path=ppt/slides/slide5.xml><?xml version="1.0" encoding="utf-8"?>
-<p:sld xmlns:a="http://schemas.openxmlformats.org/drawingml/2006/main" xmlns:r="http://schemas.openxmlformats.org/officeDocument/2006/relationships" xmlns:p="http://schemas.openxmlformats.org/presentationml/2006/main">
+<p:sld xmlns:a="http://schemas.openxmlformats.org/drawingml/2006/main" xmlns:p="http://schemas.openxmlformats.org/presentationml/2006/main" xmlns:r="http://schemas.openxmlformats.org/officeDocument/2006/relationships">
   <p:cSld>
     <p:spTree>
       <p:nvGrpSpPr>
@@ -18982,14 +20489,7 @@
         <p:cNvGrpSpPr/>
         <p:nvPr/>
       </p:nvGrpSpPr>
-      <p:grpSpPr>
-        <a:xfrm>
-          <a:off x="0" y="0"/>
-          <a:ext cx="0" cy="0"/>
-          <a:chOff x="0" y="0"/>
-          <a:chExt cx="0" cy="0"/>
-        </a:xfrm>
-      </p:grpSpPr>
+      <p:grpSpPr/>
       <p:sp>
         <p:nvSpPr>
           <p:cNvPr id="2" name="Title 1"/>
@@ -19013,12 +20513,12 @@
       </p:sp>
       <p:pic>
         <p:nvPicPr>
-          <p:cNvPr id="3" name="Picture Placeholder 2" descr="many-stock-prices-facet.png"/>
+          <p:cNvPr id="3" name="Picture Placeholder 2" descr="chart2.png"/>
           <p:cNvPicPr>
             <a:picLocks noGrp="1" noChangeAspect="1"/>
           </p:cNvPicPr>
           <p:nvPr>
-            <p:ph type="pic" sz="quarter" idx="10"/>
+            <p:ph type="pic" idx="10" sz="quarter"/>
           </p:nvPr>
         </p:nvPicPr>
         <p:blipFill>
@@ -19037,7 +20537,7 @@
             <a:spLocks noGrp="1"/>
           </p:cNvSpPr>
           <p:nvPr>
-            <p:ph type="body" sz="quarter" idx="11"/>
+            <p:ph type="body" idx="11" sz="quarter"/>
           </p:nvPr>
         </p:nvSpPr>
         <p:spPr/>
@@ -19060,7 +20560,7 @@
 </file>
 
 <file path=ppt/slides/slide6.xml><?xml version="1.0" encoding="utf-8"?>
-<p:sld xmlns:a="http://schemas.openxmlformats.org/drawingml/2006/main" xmlns:r="http://schemas.openxmlformats.org/officeDocument/2006/relationships" xmlns:p="http://schemas.openxmlformats.org/presentationml/2006/main">
+<p:sld xmlns:a="http://schemas.openxmlformats.org/drawingml/2006/main" xmlns:p="http://schemas.openxmlformats.org/presentationml/2006/main" xmlns:r="http://schemas.openxmlformats.org/officeDocument/2006/relationships">
   <p:cSld>
     <p:spTree>
       <p:nvGrpSpPr>
@@ -19068,14 +20568,7 @@
         <p:cNvGrpSpPr/>
         <p:nvPr/>
       </p:nvGrpSpPr>
-      <p:grpSpPr>
-        <a:xfrm>
-          <a:off x="0" y="0"/>
-          <a:ext cx="0" cy="0"/>
-          <a:chOff x="0" y="0"/>
-          <a:chExt cx="0" cy="0"/>
-        </a:xfrm>
-      </p:grpSpPr>
+      <p:grpSpPr/>
       <p:sp>
         <p:nvSpPr>
           <p:cNvPr id="2" name="Title 1"/>
@@ -19099,12 +20592,12 @@
       </p:sp>
       <p:pic>
         <p:nvPicPr>
-          <p:cNvPr id="3" name="Picture Placeholder 2" descr="spray-by-type.png"/>
+          <p:cNvPr id="3" name="Picture Placeholder 2" descr="chart3.png"/>
           <p:cNvPicPr>
             <a:picLocks noGrp="1" noChangeAspect="1"/>
           </p:cNvPicPr>
           <p:nvPr>
-            <p:ph type="pic" sz="quarter" idx="10"/>
+            <p:ph type="pic" idx="10" sz="quarter"/>
           </p:nvPr>
         </p:nvPicPr>
         <p:blipFill>
@@ -19123,7 +20616,7 @@
             <a:spLocks noGrp="1"/>
           </p:cNvSpPr>
           <p:nvPr>
-            <p:ph type="body" sz="quarter" idx="11"/>
+            <p:ph type="body" idx="11" sz="quarter"/>
           </p:nvPr>
         </p:nvSpPr>
         <p:spPr/>
@@ -19133,6 +20626,1856 @@
           <a:p>
             <a:r>
               <a:t>this slide has data on it!</a:t>
+            </a:r>
+          </a:p>
+        </p:txBody>
+      </p:sp>
+    </p:spTree>
+  </p:cSld>
+  <p:clrMapOvr>
+    <a:masterClrMapping/>
+  </p:clrMapOvr>
+</p:sld>
+</file>
+
+<file path=ppt/slides/slide7.xml><?xml version="1.0" encoding="utf-8"?>
+<p:sld xmlns:a="http://schemas.openxmlformats.org/drawingml/2006/main" xmlns:p="http://schemas.openxmlformats.org/presentationml/2006/main" xmlns:r="http://schemas.openxmlformats.org/officeDocument/2006/relationships">
+  <p:cSld>
+    <p:spTree>
+      <p:nvGrpSpPr>
+        <p:cNvPr id="1" name=""/>
+        <p:cNvGrpSpPr/>
+        <p:nvPr/>
+      </p:nvGrpSpPr>
+      <p:grpSpPr/>
+      <p:sp>
+        <p:nvSpPr>
+          <p:cNvPr id="2" name="Title 1"/>
+          <p:cNvSpPr>
+            <a:spLocks noGrp="1"/>
+          </p:cNvSpPr>
+          <p:nvPr>
+            <p:ph type="title"/>
+          </p:nvPr>
+        </p:nvSpPr>
+        <p:spPr/>
+        <p:txBody>
+          <a:bodyPr/>
+          <a:lstStyle/>
+          <a:p/>
+        </p:txBody>
+      </p:sp>
+      <p:sp>
+        <p:nvSpPr>
+          <p:cNvPr id="3" name="Text Placeholder 2"/>
+          <p:cNvSpPr>
+            <a:spLocks noGrp="1"/>
+          </p:cNvSpPr>
+          <p:nvPr>
+            <p:ph type="body" idx="11" sz="quarter"/>
+          </p:nvPr>
+        </p:nvSpPr>
+        <p:spPr/>
+        <p:txBody>
+          <a:bodyPr/>
+          <a:lstStyle/>
+          <a:p/>
+        </p:txBody>
+      </p:sp>
+      <p:graphicFrame>
+        <p:nvGraphicFramePr>
+          <p:cNvPr id="4" name="Table Placeholder 3"/>
+          <p:cNvGraphicFramePr>
+            <a:graphicFrameLocks noGrp="1"/>
+          </p:cNvGraphicFramePr>
+          <p:nvPr>
+            <p:ph type="tbl" idx="12" sz="quarter"/>
+          </p:nvPr>
+        </p:nvGraphicFramePr>
+        <p:xfrm>
+          <a:off x="130175" y="777875"/>
+          <a:ext cx="6673581" cy="3337560"/>
+        </p:xfrm>
+        <a:graphic>
+          <a:graphicData uri="http://schemas.openxmlformats.org/drawingml/2006/table">
+            <a:tbl>
+              <a:tblPr firstRow="1" bandRow="1">
+                <a:tableStyleId>{5C22544A-7EE6-4342-B048-85BDC9FD1C3A}</a:tableStyleId>
+              </a:tblPr>
+              <a:tblGrid>
+                <a:gridCol w="2224527"/>
+                <a:gridCol w="2224527"/>
+                <a:gridCol w="2224527"/>
+              </a:tblGrid>
+              <a:tr h="370840">
+                <a:tc>
+                  <a:txBody>
+                    <a:bodyPr/>
+                    <a:lstStyle/>
+                    <a:p>
+                      <a:pPr>
+                        <a:defRPr>
+                          <a:solidFill>
+                            <a:srgbClr val="FFFFFF"/>
+                          </a:solidFill>
+                        </a:defRPr>
+                      </a:pPr>
+                      <a:r>
+                        <a:t>count</a:t>
+                      </a:r>
+                    </a:p>
+                  </a:txBody>
+                  <a:tcPr>
+                    <a:lnL w="12700" cap="flat" cmpd="sng" algn="ctr">
+                      <a:NoFill>
+                        <a:srgbClr val="000000"/>
+                      </a:NoFill>
+                      <a:prstDash val="solid"/>
+                      <a:round/>
+                      <a:headEnd type="none" w="med" len="med"/>
+                      <a:tailEnd type="none" w="med" len="med"/>
+                    </a:lnL>
+                    <a:lnR w="12700" cap="flat" cmpd="sng" algn="ctr">
+                      <a:NoFill>
+                        <a:srgbClr val="000000"/>
+                      </a:NoFill>
+                      <a:prstDash val="solid"/>
+                      <a:round/>
+                      <a:headEnd type="none" w="med" len="med"/>
+                      <a:tailEnd type="none" w="med" len="med"/>
+                    </a:lnR>
+                    <a:lnT w="12700" cap="flat" cmpd="sng" algn="ctr">
+                      <a:NoFill>
+                        <a:srgbClr val="000000"/>
+                      </a:NoFill>
+                      <a:prstDash val="solid"/>
+                      <a:round/>
+                      <a:headEnd type="none" w="med" len="med"/>
+                      <a:tailEnd type="none" w="med" len="med"/>
+                    </a:lnT>
+                    <a:lnB w="12700" cap="flat" cmpd="sng" algn="ctr">
+                      <a:NoFill>
+                        <a:srgbClr val="000000"/>
+                      </a:NoFill>
+                      <a:prstDash val="solid"/>
+                      <a:round/>
+                      <a:headEnd type="none" w="med" len="med"/>
+                      <a:tailEnd type="none" w="med" len="med"/>
+                    </a:lnB>
+                    <a:solidFill>
+                      <a:srgbClr val="051E4A"/>
+                    </a:solidFill>
+                  </a:tcPr>
+                </a:tc>
+                <a:tc>
+                  <a:txBody>
+                    <a:bodyPr/>
+                    <a:lstStyle/>
+                    <a:p>
+                      <a:pPr>
+                        <a:defRPr>
+                          <a:solidFill>
+                            <a:srgbClr val="FFFFFF"/>
+                          </a:solidFill>
+                        </a:defRPr>
+                      </a:pPr>
+                      <a:r>
+                        <a:t>spray</a:t>
+                      </a:r>
+                    </a:p>
+                  </a:txBody>
+                  <a:tcPr>
+                    <a:lnL w="12700" cap="flat" cmpd="sng" algn="ctr">
+                      <a:NoFill>
+                        <a:srgbClr val="000000"/>
+                      </a:NoFill>
+                      <a:prstDash val="solid"/>
+                      <a:round/>
+                      <a:headEnd type="none" w="med" len="med"/>
+                      <a:tailEnd type="none" w="med" len="med"/>
+                    </a:lnL>
+                    <a:lnR w="12700" cap="flat" cmpd="sng" algn="ctr">
+                      <a:NoFill>
+                        <a:srgbClr val="000000"/>
+                      </a:NoFill>
+                      <a:prstDash val="solid"/>
+                      <a:round/>
+                      <a:headEnd type="none" w="med" len="med"/>
+                      <a:tailEnd type="none" w="med" len="med"/>
+                    </a:lnR>
+                    <a:lnT w="12700" cap="flat" cmpd="sng" algn="ctr">
+                      <a:NoFill>
+                        <a:srgbClr val="000000"/>
+                      </a:NoFill>
+                      <a:prstDash val="solid"/>
+                      <a:round/>
+                      <a:headEnd type="none" w="med" len="med"/>
+                      <a:tailEnd type="none" w="med" len="med"/>
+                    </a:lnT>
+                    <a:lnB w="12700" cap="flat" cmpd="sng" algn="ctr">
+                      <a:NoFill>
+                        <a:srgbClr val="000000"/>
+                      </a:NoFill>
+                      <a:prstDash val="solid"/>
+                      <a:round/>
+                      <a:headEnd type="none" w="med" len="med"/>
+                      <a:tailEnd type="none" w="med" len="med"/>
+                    </a:lnB>
+                    <a:solidFill>
+                      <a:srgbClr val="051E4A"/>
+                    </a:solidFill>
+                  </a:tcPr>
+                </a:tc>
+                <a:tc>
+                  <a:txBody>
+                    <a:bodyPr/>
+                    <a:lstStyle/>
+                    <a:p>
+                      <a:pPr>
+                        <a:defRPr>
+                          <a:solidFill>
+                            <a:srgbClr val="FFFFFF"/>
+                          </a:solidFill>
+                        </a:defRPr>
+                      </a:pPr>
+                      <a:r>
+                        <a:t>m2</a:t>
+                      </a:r>
+                    </a:p>
+                  </a:txBody>
+                  <a:tcPr>
+                    <a:lnL w="12700" cap="flat" cmpd="sng" algn="ctr">
+                      <a:NoFill>
+                        <a:srgbClr val="000000"/>
+                      </a:NoFill>
+                      <a:prstDash val="solid"/>
+                      <a:round/>
+                      <a:headEnd type="none" w="med" len="med"/>
+                      <a:tailEnd type="none" w="med" len="med"/>
+                    </a:lnL>
+                    <a:lnR w="12700" cap="flat" cmpd="sng" algn="ctr">
+                      <a:NoFill>
+                        <a:srgbClr val="000000"/>
+                      </a:NoFill>
+                      <a:prstDash val="solid"/>
+                      <a:round/>
+                      <a:headEnd type="none" w="med" len="med"/>
+                      <a:tailEnd type="none" w="med" len="med"/>
+                    </a:lnR>
+                    <a:lnT w="12700" cap="flat" cmpd="sng" algn="ctr">
+                      <a:NoFill>
+                        <a:srgbClr val="000000"/>
+                      </a:NoFill>
+                      <a:prstDash val="solid"/>
+                      <a:round/>
+                      <a:headEnd type="none" w="med" len="med"/>
+                      <a:tailEnd type="none" w="med" len="med"/>
+                    </a:lnT>
+                    <a:lnB w="12700" cap="flat" cmpd="sng" algn="ctr">
+                      <a:NoFill>
+                        <a:srgbClr val="000000"/>
+                      </a:NoFill>
+                      <a:prstDash val="solid"/>
+                      <a:round/>
+                      <a:headEnd type="none" w="med" len="med"/>
+                      <a:tailEnd type="none" w="med" len="med"/>
+                    </a:lnB>
+                    <a:solidFill>
+                      <a:srgbClr val="051E4A"/>
+                    </a:solidFill>
+                  </a:tcPr>
+                </a:tc>
+              </a:tr>
+              <a:tr h="370840">
+                <a:tc>
+                  <a:txBody>
+                    <a:bodyPr/>
+                    <a:lstStyle/>
+                    <a:p>
+                      <a:pPr>
+                        <a:defRPr>
+                          <a:solidFill>
+                            <a:srgbClr val="051E4A"/>
+                          </a:solidFill>
+                        </a:defRPr>
+                      </a:pPr>
+                      <a:r>
+                        <a:t>10</a:t>
+                      </a:r>
+                    </a:p>
+                  </a:txBody>
+                  <a:tcPr>
+                    <a:lnL w="12700" cap="flat" cmpd="sng" algn="ctr">
+                      <a:NoFill>
+                        <a:srgbClr val="000000"/>
+                      </a:NoFill>
+                      <a:prstDash val="solid"/>
+                      <a:round/>
+                      <a:headEnd type="none" w="med" len="med"/>
+                      <a:tailEnd type="none" w="med" len="med"/>
+                    </a:lnL>
+                    <a:lnR w="12700" cap="flat" cmpd="sng" algn="ctr">
+                      <a:NoFill>
+                        <a:srgbClr val="000000"/>
+                      </a:NoFill>
+                      <a:prstDash val="solid"/>
+                      <a:round/>
+                      <a:headEnd type="none" w="med" len="med"/>
+                      <a:tailEnd type="none" w="med" len="med"/>
+                    </a:lnR>
+                    <a:lnT w="12700" cap="flat" cmpd="sng" algn="ctr">
+                      <a:NoFill>
+                        <a:srgbClr val="000000"/>
+                      </a:NoFill>
+                      <a:prstDash val="solid"/>
+                      <a:round/>
+                      <a:headEnd type="none" w="med" len="med"/>
+                      <a:tailEnd type="none" w="med" len="med"/>
+                    </a:lnT>
+                    <a:lnB w="12700" cap="flat" cmpd="sng" algn="ctr">
+                      <a:NoFill>
+                        <a:srgbClr val="000000"/>
+                      </a:NoFill>
+                      <a:prstDash val="solid"/>
+                      <a:round/>
+                      <a:headEnd type="none" w="med" len="med"/>
+                      <a:tailEnd type="none" w="med" len="med"/>
+                    </a:lnB>
+                    <a:solidFill>
+                      <a:srgbClr val="FFFFF2"/>
+                    </a:solidFill>
+                  </a:tcPr>
+                </a:tc>
+                <a:tc>
+                  <a:txBody>
+                    <a:bodyPr/>
+                    <a:lstStyle/>
+                    <a:p>
+                      <a:pPr>
+                        <a:defRPr>
+                          <a:solidFill>
+                            <a:srgbClr val="051E4A"/>
+                          </a:solidFill>
+                        </a:defRPr>
+                      </a:pPr>
+                      <a:r>
+                        <a:t>A</a:t>
+                      </a:r>
+                    </a:p>
+                  </a:txBody>
+                  <a:tcPr>
+                    <a:lnL w="12700" cap="flat" cmpd="sng" algn="ctr">
+                      <a:NoFill>
+                        <a:srgbClr val="000000"/>
+                      </a:NoFill>
+                      <a:prstDash val="solid"/>
+                      <a:round/>
+                      <a:headEnd type="none" w="med" len="med"/>
+                      <a:tailEnd type="none" w="med" len="med"/>
+                    </a:lnL>
+                    <a:lnR w="12700" cap="flat" cmpd="sng" algn="ctr">
+                      <a:NoFill>
+                        <a:srgbClr val="000000"/>
+                      </a:NoFill>
+                      <a:prstDash val="solid"/>
+                      <a:round/>
+                      <a:headEnd type="none" w="med" len="med"/>
+                      <a:tailEnd type="none" w="med" len="med"/>
+                    </a:lnR>
+                    <a:lnT w="12700" cap="flat" cmpd="sng" algn="ctr">
+                      <a:NoFill>
+                        <a:srgbClr val="000000"/>
+                      </a:NoFill>
+                      <a:prstDash val="solid"/>
+                      <a:round/>
+                      <a:headEnd type="none" w="med" len="med"/>
+                      <a:tailEnd type="none" w="med" len="med"/>
+                    </a:lnT>
+                    <a:lnB w="12700" cap="flat" cmpd="sng" algn="ctr">
+                      <a:NoFill>
+                        <a:srgbClr val="000000"/>
+                      </a:NoFill>
+                      <a:prstDash val="solid"/>
+                      <a:round/>
+                      <a:headEnd type="none" w="med" len="med"/>
+                      <a:tailEnd type="none" w="med" len="med"/>
+                    </a:lnB>
+                    <a:solidFill>
+                      <a:srgbClr val="FFFFF2"/>
+                    </a:solidFill>
+                  </a:tcPr>
+                </a:tc>
+                <a:tc>
+                  <a:txBody>
+                    <a:bodyPr/>
+                    <a:lstStyle/>
+                    <a:p>
+                      <a:pPr>
+                        <a:defRPr>
+                          <a:solidFill>
+                            <a:srgbClr val="051E4A"/>
+                          </a:solidFill>
+                        </a:defRPr>
+                      </a:pPr>
+                      <a:r>
+                        <a:t>$11</a:t>
+                      </a:r>
+                    </a:p>
+                  </a:txBody>
+                  <a:tcPr>
+                    <a:lnL w="12700" cap="flat" cmpd="sng" algn="ctr">
+                      <a:NoFill>
+                        <a:srgbClr val="000000"/>
+                      </a:NoFill>
+                      <a:prstDash val="solid"/>
+                      <a:round/>
+                      <a:headEnd type="none" w="med" len="med"/>
+                      <a:tailEnd type="none" w="med" len="med"/>
+                    </a:lnL>
+                    <a:lnR w="12700" cap="flat" cmpd="sng" algn="ctr">
+                      <a:NoFill>
+                        <a:srgbClr val="000000"/>
+                      </a:NoFill>
+                      <a:prstDash val="solid"/>
+                      <a:round/>
+                      <a:headEnd type="none" w="med" len="med"/>
+                      <a:tailEnd type="none" w="med" len="med"/>
+                    </a:lnR>
+                    <a:lnT w="12700" cap="flat" cmpd="sng" algn="ctr">
+                      <a:NoFill>
+                        <a:srgbClr val="000000"/>
+                      </a:NoFill>
+                      <a:prstDash val="solid"/>
+                      <a:round/>
+                      <a:headEnd type="none" w="med" len="med"/>
+                      <a:tailEnd type="none" w="med" len="med"/>
+                    </a:lnT>
+                    <a:lnB w="12700" cap="flat" cmpd="sng" algn="ctr">
+                      <a:NoFill>
+                        <a:srgbClr val="000000"/>
+                      </a:NoFill>
+                      <a:prstDash val="solid"/>
+                      <a:round/>
+                      <a:headEnd type="none" w="med" len="med"/>
+                      <a:tailEnd type="none" w="med" len="med"/>
+                    </a:lnB>
+                    <a:solidFill>
+                      <a:srgbClr val="5EED4E"/>
+                    </a:solidFill>
+                  </a:tcPr>
+                </a:tc>
+              </a:tr>
+              <a:tr h="370840">
+                <a:tc>
+                  <a:txBody>
+                    <a:bodyPr/>
+                    <a:lstStyle/>
+                    <a:p>
+                      <a:pPr>
+                        <a:defRPr>
+                          <a:solidFill>
+                            <a:srgbClr val="051E4A"/>
+                          </a:solidFill>
+                        </a:defRPr>
+                      </a:pPr>
+                      <a:r>
+                        <a:t>7</a:t>
+                      </a:r>
+                    </a:p>
+                  </a:txBody>
+                  <a:tcPr>
+                    <a:lnL w="12700" cap="flat" cmpd="sng" algn="ctr">
+                      <a:NoFill>
+                        <a:srgbClr val="000000"/>
+                      </a:NoFill>
+                      <a:prstDash val="solid"/>
+                      <a:round/>
+                      <a:headEnd type="none" w="med" len="med"/>
+                      <a:tailEnd type="none" w="med" len="med"/>
+                    </a:lnL>
+                    <a:lnR w="12700" cap="flat" cmpd="sng" algn="ctr">
+                      <a:NoFill>
+                        <a:srgbClr val="000000"/>
+                      </a:NoFill>
+                      <a:prstDash val="solid"/>
+                      <a:round/>
+                      <a:headEnd type="none" w="med" len="med"/>
+                      <a:tailEnd type="none" w="med" len="med"/>
+                    </a:lnR>
+                    <a:lnT w="12700" cap="flat" cmpd="sng" algn="ctr">
+                      <a:NoFill>
+                        <a:srgbClr val="000000"/>
+                      </a:NoFill>
+                      <a:prstDash val="solid"/>
+                      <a:round/>
+                      <a:headEnd type="none" w="med" len="med"/>
+                      <a:tailEnd type="none" w="med" len="med"/>
+                    </a:lnT>
+                    <a:lnB w="12700" cap="flat" cmpd="sng" algn="ctr">
+                      <a:NoFill>
+                        <a:srgbClr val="000000"/>
+                      </a:NoFill>
+                      <a:prstDash val="solid"/>
+                      <a:round/>
+                      <a:headEnd type="none" w="med" len="med"/>
+                      <a:tailEnd type="none" w="med" len="med"/>
+                    </a:lnB>
+                    <a:solidFill>
+                      <a:srgbClr val="FFFFF2"/>
+                    </a:solidFill>
+                  </a:tcPr>
+                </a:tc>
+                <a:tc>
+                  <a:txBody>
+                    <a:bodyPr/>
+                    <a:lstStyle/>
+                    <a:p>
+                      <a:pPr>
+                        <a:defRPr>
+                          <a:solidFill>
+                            <a:srgbClr val="051E4A"/>
+                          </a:solidFill>
+                        </a:defRPr>
+                      </a:pPr>
+                      <a:r>
+                        <a:t>A</a:t>
+                      </a:r>
+                    </a:p>
+                  </a:txBody>
+                  <a:tcPr>
+                    <a:lnL w="12700" cap="flat" cmpd="sng" algn="ctr">
+                      <a:NoFill>
+                        <a:srgbClr val="000000"/>
+                      </a:NoFill>
+                      <a:prstDash val="solid"/>
+                      <a:round/>
+                      <a:headEnd type="none" w="med" len="med"/>
+                      <a:tailEnd type="none" w="med" len="med"/>
+                    </a:lnL>
+                    <a:lnR w="12700" cap="flat" cmpd="sng" algn="ctr">
+                      <a:NoFill>
+                        <a:srgbClr val="000000"/>
+                      </a:NoFill>
+                      <a:prstDash val="solid"/>
+                      <a:round/>
+                      <a:headEnd type="none" w="med" len="med"/>
+                      <a:tailEnd type="none" w="med" len="med"/>
+                    </a:lnR>
+                    <a:lnT w="12700" cap="flat" cmpd="sng" algn="ctr">
+                      <a:NoFill>
+                        <a:srgbClr val="000000"/>
+                      </a:NoFill>
+                      <a:prstDash val="solid"/>
+                      <a:round/>
+                      <a:headEnd type="none" w="med" len="med"/>
+                      <a:tailEnd type="none" w="med" len="med"/>
+                    </a:lnT>
+                    <a:lnB w="12700" cap="flat" cmpd="sng" algn="ctr">
+                      <a:NoFill>
+                        <a:srgbClr val="000000"/>
+                      </a:NoFill>
+                      <a:prstDash val="solid"/>
+                      <a:round/>
+                      <a:headEnd type="none" w="med" len="med"/>
+                      <a:tailEnd type="none" w="med" len="med"/>
+                    </a:lnB>
+                    <a:solidFill>
+                      <a:srgbClr val="FFFFF2"/>
+                    </a:solidFill>
+                  </a:tcPr>
+                </a:tc>
+                <a:tc>
+                  <a:txBody>
+                    <a:bodyPr/>
+                    <a:lstStyle/>
+                    <a:p>
+                      <a:pPr>
+                        <a:defRPr>
+                          <a:solidFill>
+                            <a:srgbClr val="051E4A"/>
+                          </a:solidFill>
+                        </a:defRPr>
+                      </a:pPr>
+                      <a:r>
+                        <a:t>$3</a:t>
+                      </a:r>
+                    </a:p>
+                  </a:txBody>
+                  <a:tcPr>
+                    <a:lnL w="12700" cap="flat" cmpd="sng" algn="ctr">
+                      <a:NoFill>
+                        <a:srgbClr val="000000"/>
+                      </a:NoFill>
+                      <a:prstDash val="solid"/>
+                      <a:round/>
+                      <a:headEnd type="none" w="med" len="med"/>
+                      <a:tailEnd type="none" w="med" len="med"/>
+                    </a:lnL>
+                    <a:lnR w="12700" cap="flat" cmpd="sng" algn="ctr">
+                      <a:NoFill>
+                        <a:srgbClr val="000000"/>
+                      </a:NoFill>
+                      <a:prstDash val="solid"/>
+                      <a:round/>
+                      <a:headEnd type="none" w="med" len="med"/>
+                      <a:tailEnd type="none" w="med" len="med"/>
+                    </a:lnR>
+                    <a:lnT w="12700" cap="flat" cmpd="sng" algn="ctr">
+                      <a:NoFill>
+                        <a:srgbClr val="000000"/>
+                      </a:NoFill>
+                      <a:prstDash val="solid"/>
+                      <a:round/>
+                      <a:headEnd type="none" w="med" len="med"/>
+                      <a:tailEnd type="none" w="med" len="med"/>
+                    </a:lnT>
+                    <a:lnB w="12700" cap="flat" cmpd="sng" algn="ctr">
+                      <a:NoFill>
+                        <a:srgbClr val="000000"/>
+                      </a:NoFill>
+                      <a:prstDash val="solid"/>
+                      <a:round/>
+                      <a:headEnd type="none" w="med" len="med"/>
+                      <a:tailEnd type="none" w="med" len="med"/>
+                    </a:lnB>
+                    <a:solidFill>
+                      <a:srgbClr val="ED4E61"/>
+                    </a:solidFill>
+                  </a:tcPr>
+                </a:tc>
+              </a:tr>
+              <a:tr h="370840">
+                <a:tc>
+                  <a:txBody>
+                    <a:bodyPr/>
+                    <a:lstStyle/>
+                    <a:p>
+                      <a:pPr>
+                        <a:defRPr>
+                          <a:solidFill>
+                            <a:srgbClr val="051E4A"/>
+                          </a:solidFill>
+                        </a:defRPr>
+                      </a:pPr>
+                      <a:r>
+                        <a:t>20</a:t>
+                      </a:r>
+                    </a:p>
+                  </a:txBody>
+                  <a:tcPr>
+                    <a:lnL w="12700" cap="flat" cmpd="sng" algn="ctr">
+                      <a:NoFill>
+                        <a:srgbClr val="000000"/>
+                      </a:NoFill>
+                      <a:prstDash val="solid"/>
+                      <a:round/>
+                      <a:headEnd type="none" w="med" len="med"/>
+                      <a:tailEnd type="none" w="med" len="med"/>
+                    </a:lnL>
+                    <a:lnR w="12700" cap="flat" cmpd="sng" algn="ctr">
+                      <a:NoFill>
+                        <a:srgbClr val="000000"/>
+                      </a:NoFill>
+                      <a:prstDash val="solid"/>
+                      <a:round/>
+                      <a:headEnd type="none" w="med" len="med"/>
+                      <a:tailEnd type="none" w="med" len="med"/>
+                    </a:lnR>
+                    <a:lnT w="12700" cap="flat" cmpd="sng" algn="ctr">
+                      <a:NoFill>
+                        <a:srgbClr val="000000"/>
+                      </a:NoFill>
+                      <a:prstDash val="solid"/>
+                      <a:round/>
+                      <a:headEnd type="none" w="med" len="med"/>
+                      <a:tailEnd type="none" w="med" len="med"/>
+                    </a:lnT>
+                    <a:lnB w="12700" cap="flat" cmpd="sng" algn="ctr">
+                      <a:NoFill>
+                        <a:srgbClr val="000000"/>
+                      </a:NoFill>
+                      <a:prstDash val="solid"/>
+                      <a:round/>
+                      <a:headEnd type="none" w="med" len="med"/>
+                      <a:tailEnd type="none" w="med" len="med"/>
+                    </a:lnB>
+                    <a:solidFill>
+                      <a:srgbClr val="FFFFF2"/>
+                    </a:solidFill>
+                  </a:tcPr>
+                </a:tc>
+                <a:tc>
+                  <a:txBody>
+                    <a:bodyPr/>
+                    <a:lstStyle/>
+                    <a:p>
+                      <a:pPr>
+                        <a:defRPr>
+                          <a:solidFill>
+                            <a:srgbClr val="051E4A"/>
+                          </a:solidFill>
+                        </a:defRPr>
+                      </a:pPr>
+                      <a:r>
+                        <a:t>A</a:t>
+                      </a:r>
+                    </a:p>
+                  </a:txBody>
+                  <a:tcPr>
+                    <a:lnL w="12700" cap="flat" cmpd="sng" algn="ctr">
+                      <a:NoFill>
+                        <a:srgbClr val="000000"/>
+                      </a:NoFill>
+                      <a:prstDash val="solid"/>
+                      <a:round/>
+                      <a:headEnd type="none" w="med" len="med"/>
+                      <a:tailEnd type="none" w="med" len="med"/>
+                    </a:lnL>
+                    <a:lnR w="12700" cap="flat" cmpd="sng" algn="ctr">
+                      <a:NoFill>
+                        <a:srgbClr val="000000"/>
+                      </a:NoFill>
+                      <a:prstDash val="solid"/>
+                      <a:round/>
+                      <a:headEnd type="none" w="med" len="med"/>
+                      <a:tailEnd type="none" w="med" len="med"/>
+                    </a:lnR>
+                    <a:lnT w="12700" cap="flat" cmpd="sng" algn="ctr">
+                      <a:NoFill>
+                        <a:srgbClr val="000000"/>
+                      </a:NoFill>
+                      <a:prstDash val="solid"/>
+                      <a:round/>
+                      <a:headEnd type="none" w="med" len="med"/>
+                      <a:tailEnd type="none" w="med" len="med"/>
+                    </a:lnT>
+                    <a:lnB w="12700" cap="flat" cmpd="sng" algn="ctr">
+                      <a:NoFill>
+                        <a:srgbClr val="000000"/>
+                      </a:NoFill>
+                      <a:prstDash val="solid"/>
+                      <a:round/>
+                      <a:headEnd type="none" w="med" len="med"/>
+                      <a:tailEnd type="none" w="med" len="med"/>
+                    </a:lnB>
+                    <a:solidFill>
+                      <a:srgbClr val="FFFFF2"/>
+                    </a:solidFill>
+                  </a:tcPr>
+                </a:tc>
+                <a:tc>
+                  <a:txBody>
+                    <a:bodyPr/>
+                    <a:lstStyle/>
+                    <a:p>
+                      <a:pPr>
+                        <a:defRPr>
+                          <a:solidFill>
+                            <a:srgbClr val="051E4A"/>
+                          </a:solidFill>
+                        </a:defRPr>
+                      </a:pPr>
+                      <a:r>
+                        <a:t>$22</a:t>
+                      </a:r>
+                    </a:p>
+                  </a:txBody>
+                  <a:tcPr>
+                    <a:lnL w="12700" cap="flat" cmpd="sng" algn="ctr">
+                      <a:NoFill>
+                        <a:srgbClr val="000000"/>
+                      </a:NoFill>
+                      <a:prstDash val="solid"/>
+                      <a:round/>
+                      <a:headEnd type="none" w="med" len="med"/>
+                      <a:tailEnd type="none" w="med" len="med"/>
+                    </a:lnL>
+                    <a:lnR w="12700" cap="flat" cmpd="sng" algn="ctr">
+                      <a:NoFill>
+                        <a:srgbClr val="000000"/>
+                      </a:NoFill>
+                      <a:prstDash val="solid"/>
+                      <a:round/>
+                      <a:headEnd type="none" w="med" len="med"/>
+                      <a:tailEnd type="none" w="med" len="med"/>
+                    </a:lnR>
+                    <a:lnT w="12700" cap="flat" cmpd="sng" algn="ctr">
+                      <a:NoFill>
+                        <a:srgbClr val="000000"/>
+                      </a:NoFill>
+                      <a:prstDash val="solid"/>
+                      <a:round/>
+                      <a:headEnd type="none" w="med" len="med"/>
+                      <a:tailEnd type="none" w="med" len="med"/>
+                    </a:lnT>
+                    <a:lnB w="12700" cap="flat" cmpd="sng" algn="ctr">
+                      <a:NoFill>
+                        <a:srgbClr val="000000"/>
+                      </a:NoFill>
+                      <a:prstDash val="solid"/>
+                      <a:round/>
+                      <a:headEnd type="none" w="med" len="med"/>
+                      <a:tailEnd type="none" w="med" len="med"/>
+                    </a:lnB>
+                    <a:solidFill>
+                      <a:srgbClr val="5EED4E"/>
+                    </a:solidFill>
+                  </a:tcPr>
+                </a:tc>
+              </a:tr>
+              <a:tr h="370840">
+                <a:tc>
+                  <a:txBody>
+                    <a:bodyPr/>
+                    <a:lstStyle/>
+                    <a:p>
+                      <a:pPr>
+                        <a:defRPr>
+                          <a:solidFill>
+                            <a:srgbClr val="051E4A"/>
+                          </a:solidFill>
+                        </a:defRPr>
+                      </a:pPr>
+                      <a:r>
+                        <a:t>14</a:t>
+                      </a:r>
+                    </a:p>
+                  </a:txBody>
+                  <a:tcPr>
+                    <a:lnL w="12700" cap="flat" cmpd="sng" algn="ctr">
+                      <a:NoFill>
+                        <a:srgbClr val="000000"/>
+                      </a:NoFill>
+                      <a:prstDash val="solid"/>
+                      <a:round/>
+                      <a:headEnd type="none" w="med" len="med"/>
+                      <a:tailEnd type="none" w="med" len="med"/>
+                    </a:lnL>
+                    <a:lnR w="12700" cap="flat" cmpd="sng" algn="ctr">
+                      <a:NoFill>
+                        <a:srgbClr val="000000"/>
+                      </a:NoFill>
+                      <a:prstDash val="solid"/>
+                      <a:round/>
+                      <a:headEnd type="none" w="med" len="med"/>
+                      <a:tailEnd type="none" w="med" len="med"/>
+                    </a:lnR>
+                    <a:lnT w="12700" cap="flat" cmpd="sng" algn="ctr">
+                      <a:NoFill>
+                        <a:srgbClr val="000000"/>
+                      </a:NoFill>
+                      <a:prstDash val="solid"/>
+                      <a:round/>
+                      <a:headEnd type="none" w="med" len="med"/>
+                      <a:tailEnd type="none" w="med" len="med"/>
+                    </a:lnT>
+                    <a:lnB w="12700" cap="flat" cmpd="sng" algn="ctr">
+                      <a:NoFill>
+                        <a:srgbClr val="000000"/>
+                      </a:NoFill>
+                      <a:prstDash val="solid"/>
+                      <a:round/>
+                      <a:headEnd type="none" w="med" len="med"/>
+                      <a:tailEnd type="none" w="med" len="med"/>
+                    </a:lnB>
+                    <a:solidFill>
+                      <a:srgbClr val="FFFFF2"/>
+                    </a:solidFill>
+                  </a:tcPr>
+                </a:tc>
+                <a:tc>
+                  <a:txBody>
+                    <a:bodyPr/>
+                    <a:lstStyle/>
+                    <a:p>
+                      <a:pPr>
+                        <a:defRPr>
+                          <a:solidFill>
+                            <a:srgbClr val="051E4A"/>
+                          </a:solidFill>
+                        </a:defRPr>
+                      </a:pPr>
+                      <a:r>
+                        <a:t>A</a:t>
+                      </a:r>
+                    </a:p>
+                  </a:txBody>
+                  <a:tcPr>
+                    <a:lnL w="12700" cap="flat" cmpd="sng" algn="ctr">
+                      <a:NoFill>
+                        <a:srgbClr val="000000"/>
+                      </a:NoFill>
+                      <a:prstDash val="solid"/>
+                      <a:round/>
+                      <a:headEnd type="none" w="med" len="med"/>
+                      <a:tailEnd type="none" w="med" len="med"/>
+                    </a:lnL>
+                    <a:lnR w="12700" cap="flat" cmpd="sng" algn="ctr">
+                      <a:NoFill>
+                        <a:srgbClr val="000000"/>
+                      </a:NoFill>
+                      <a:prstDash val="solid"/>
+                      <a:round/>
+                      <a:headEnd type="none" w="med" len="med"/>
+                      <a:tailEnd type="none" w="med" len="med"/>
+                    </a:lnR>
+                    <a:lnT w="12700" cap="flat" cmpd="sng" algn="ctr">
+                      <a:NoFill>
+                        <a:srgbClr val="000000"/>
+                      </a:NoFill>
+                      <a:prstDash val="solid"/>
+                      <a:round/>
+                      <a:headEnd type="none" w="med" len="med"/>
+                      <a:tailEnd type="none" w="med" len="med"/>
+                    </a:lnT>
+                    <a:lnB w="12700" cap="flat" cmpd="sng" algn="ctr">
+                      <a:NoFill>
+                        <a:srgbClr val="000000"/>
+                      </a:NoFill>
+                      <a:prstDash val="solid"/>
+                      <a:round/>
+                      <a:headEnd type="none" w="med" len="med"/>
+                      <a:tailEnd type="none" w="med" len="med"/>
+                    </a:lnB>
+                    <a:solidFill>
+                      <a:srgbClr val="FFFFF2"/>
+                    </a:solidFill>
+                  </a:tcPr>
+                </a:tc>
+                <a:tc>
+                  <a:txBody>
+                    <a:bodyPr/>
+                    <a:lstStyle/>
+                    <a:p>
+                      <a:pPr>
+                        <a:defRPr>
+                          <a:solidFill>
+                            <a:srgbClr val="051E4A"/>
+                          </a:solidFill>
+                        </a:defRPr>
+                      </a:pPr>
+                      <a:r>
+                        <a:t>$15</a:t>
+                      </a:r>
+                    </a:p>
+                  </a:txBody>
+                  <a:tcPr>
+                    <a:lnL w="12700" cap="flat" cmpd="sng" algn="ctr">
+                      <a:NoFill>
+                        <a:srgbClr val="000000"/>
+                      </a:NoFill>
+                      <a:prstDash val="solid"/>
+                      <a:round/>
+                      <a:headEnd type="none" w="med" len="med"/>
+                      <a:tailEnd type="none" w="med" len="med"/>
+                    </a:lnL>
+                    <a:lnR w="12700" cap="flat" cmpd="sng" algn="ctr">
+                      <a:NoFill>
+                        <a:srgbClr val="000000"/>
+                      </a:NoFill>
+                      <a:prstDash val="solid"/>
+                      <a:round/>
+                      <a:headEnd type="none" w="med" len="med"/>
+                      <a:tailEnd type="none" w="med" len="med"/>
+                    </a:lnR>
+                    <a:lnT w="12700" cap="flat" cmpd="sng" algn="ctr">
+                      <a:NoFill>
+                        <a:srgbClr val="000000"/>
+                      </a:NoFill>
+                      <a:prstDash val="solid"/>
+                      <a:round/>
+                      <a:headEnd type="none" w="med" len="med"/>
+                      <a:tailEnd type="none" w="med" len="med"/>
+                    </a:lnT>
+                    <a:lnB w="12700" cap="flat" cmpd="sng" algn="ctr">
+                      <a:NoFill>
+                        <a:srgbClr val="000000"/>
+                      </a:NoFill>
+                      <a:prstDash val="solid"/>
+                      <a:round/>
+                      <a:headEnd type="none" w="med" len="med"/>
+                      <a:tailEnd type="none" w="med" len="med"/>
+                    </a:lnB>
+                    <a:solidFill>
+                      <a:srgbClr val="5EED4E"/>
+                    </a:solidFill>
+                  </a:tcPr>
+                </a:tc>
+              </a:tr>
+              <a:tr h="370840">
+                <a:tc>
+                  <a:txBody>
+                    <a:bodyPr/>
+                    <a:lstStyle/>
+                    <a:p>
+                      <a:pPr>
+                        <a:defRPr>
+                          <a:solidFill>
+                            <a:srgbClr val="051E4A"/>
+                          </a:solidFill>
+                        </a:defRPr>
+                      </a:pPr>
+                      <a:r>
+                        <a:t>14</a:t>
+                      </a:r>
+                    </a:p>
+                  </a:txBody>
+                  <a:tcPr>
+                    <a:lnL w="12700" cap="flat" cmpd="sng" algn="ctr">
+                      <a:NoFill>
+                        <a:srgbClr val="000000"/>
+                      </a:NoFill>
+                      <a:prstDash val="solid"/>
+                      <a:round/>
+                      <a:headEnd type="none" w="med" len="med"/>
+                      <a:tailEnd type="none" w="med" len="med"/>
+                    </a:lnL>
+                    <a:lnR w="12700" cap="flat" cmpd="sng" algn="ctr">
+                      <a:NoFill>
+                        <a:srgbClr val="000000"/>
+                      </a:NoFill>
+                      <a:prstDash val="solid"/>
+                      <a:round/>
+                      <a:headEnd type="none" w="med" len="med"/>
+                      <a:tailEnd type="none" w="med" len="med"/>
+                    </a:lnR>
+                    <a:lnT w="12700" cap="flat" cmpd="sng" algn="ctr">
+                      <a:NoFill>
+                        <a:srgbClr val="000000"/>
+                      </a:NoFill>
+                      <a:prstDash val="solid"/>
+                      <a:round/>
+                      <a:headEnd type="none" w="med" len="med"/>
+                      <a:tailEnd type="none" w="med" len="med"/>
+                    </a:lnT>
+                    <a:lnB w="12700" cap="flat" cmpd="sng" algn="ctr">
+                      <a:NoFill>
+                        <a:srgbClr val="000000"/>
+                      </a:NoFill>
+                      <a:prstDash val="solid"/>
+                      <a:round/>
+                      <a:headEnd type="none" w="med" len="med"/>
+                      <a:tailEnd type="none" w="med" len="med"/>
+                    </a:lnB>
+                    <a:solidFill>
+                      <a:srgbClr val="FFFFF2"/>
+                    </a:solidFill>
+                  </a:tcPr>
+                </a:tc>
+                <a:tc>
+                  <a:txBody>
+                    <a:bodyPr/>
+                    <a:lstStyle/>
+                    <a:p>
+                      <a:pPr>
+                        <a:defRPr>
+                          <a:solidFill>
+                            <a:srgbClr val="051E4A"/>
+                          </a:solidFill>
+                        </a:defRPr>
+                      </a:pPr>
+                      <a:r>
+                        <a:t>A</a:t>
+                      </a:r>
+                    </a:p>
+                  </a:txBody>
+                  <a:tcPr>
+                    <a:lnL w="12700" cap="flat" cmpd="sng" algn="ctr">
+                      <a:NoFill>
+                        <a:srgbClr val="000000"/>
+                      </a:NoFill>
+                      <a:prstDash val="solid"/>
+                      <a:round/>
+                      <a:headEnd type="none" w="med" len="med"/>
+                      <a:tailEnd type="none" w="med" len="med"/>
+                    </a:lnL>
+                    <a:lnR w="12700" cap="flat" cmpd="sng" algn="ctr">
+                      <a:NoFill>
+                        <a:srgbClr val="000000"/>
+                      </a:NoFill>
+                      <a:prstDash val="solid"/>
+                      <a:round/>
+                      <a:headEnd type="none" w="med" len="med"/>
+                      <a:tailEnd type="none" w="med" len="med"/>
+                    </a:lnR>
+                    <a:lnT w="12700" cap="flat" cmpd="sng" algn="ctr">
+                      <a:NoFill>
+                        <a:srgbClr val="000000"/>
+                      </a:NoFill>
+                      <a:prstDash val="solid"/>
+                      <a:round/>
+                      <a:headEnd type="none" w="med" len="med"/>
+                      <a:tailEnd type="none" w="med" len="med"/>
+                    </a:lnT>
+                    <a:lnB w="12700" cap="flat" cmpd="sng" algn="ctr">
+                      <a:NoFill>
+                        <a:srgbClr val="000000"/>
+                      </a:NoFill>
+                      <a:prstDash val="solid"/>
+                      <a:round/>
+                      <a:headEnd type="none" w="med" len="med"/>
+                      <a:tailEnd type="none" w="med" len="med"/>
+                    </a:lnB>
+                    <a:solidFill>
+                      <a:srgbClr val="FFFFF2"/>
+                    </a:solidFill>
+                  </a:tcPr>
+                </a:tc>
+                <a:tc>
+                  <a:txBody>
+                    <a:bodyPr/>
+                    <a:lstStyle/>
+                    <a:p>
+                      <a:pPr>
+                        <a:defRPr>
+                          <a:solidFill>
+                            <a:srgbClr val="051E4A"/>
+                          </a:solidFill>
+                        </a:defRPr>
+                      </a:pPr>
+                      <a:r>
+                        <a:t>$15</a:t>
+                      </a:r>
+                    </a:p>
+                  </a:txBody>
+                  <a:tcPr>
+                    <a:lnL w="12700" cap="flat" cmpd="sng" algn="ctr">
+                      <a:NoFill>
+                        <a:srgbClr val="000000"/>
+                      </a:NoFill>
+                      <a:prstDash val="solid"/>
+                      <a:round/>
+                      <a:headEnd type="none" w="med" len="med"/>
+                      <a:tailEnd type="none" w="med" len="med"/>
+                    </a:lnL>
+                    <a:lnR w="12700" cap="flat" cmpd="sng" algn="ctr">
+                      <a:NoFill>
+                        <a:srgbClr val="000000"/>
+                      </a:NoFill>
+                      <a:prstDash val="solid"/>
+                      <a:round/>
+                      <a:headEnd type="none" w="med" len="med"/>
+                      <a:tailEnd type="none" w="med" len="med"/>
+                    </a:lnR>
+                    <a:lnT w="12700" cap="flat" cmpd="sng" algn="ctr">
+                      <a:NoFill>
+                        <a:srgbClr val="000000"/>
+                      </a:NoFill>
+                      <a:prstDash val="solid"/>
+                      <a:round/>
+                      <a:headEnd type="none" w="med" len="med"/>
+                      <a:tailEnd type="none" w="med" len="med"/>
+                    </a:lnT>
+                    <a:lnB w="12700" cap="flat" cmpd="sng" algn="ctr">
+                      <a:NoFill>
+                        <a:srgbClr val="000000"/>
+                      </a:NoFill>
+                      <a:prstDash val="solid"/>
+                      <a:round/>
+                      <a:headEnd type="none" w="med" len="med"/>
+                      <a:tailEnd type="none" w="med" len="med"/>
+                    </a:lnB>
+                    <a:solidFill>
+                      <a:srgbClr val="5EED4E"/>
+                    </a:solidFill>
+                  </a:tcPr>
+                </a:tc>
+              </a:tr>
+              <a:tr h="370840">
+                <a:tc>
+                  <a:txBody>
+                    <a:bodyPr/>
+                    <a:lstStyle/>
+                    <a:p>
+                      <a:pPr>
+                        <a:defRPr>
+                          <a:solidFill>
+                            <a:srgbClr val="051E4A"/>
+                          </a:solidFill>
+                        </a:defRPr>
+                      </a:pPr>
+                      <a:r>
+                        <a:t>12</a:t>
+                      </a:r>
+                    </a:p>
+                  </a:txBody>
+                  <a:tcPr>
+                    <a:lnL w="12700" cap="flat" cmpd="sng" algn="ctr">
+                      <a:NoFill>
+                        <a:srgbClr val="000000"/>
+                      </a:NoFill>
+                      <a:prstDash val="solid"/>
+                      <a:round/>
+                      <a:headEnd type="none" w="med" len="med"/>
+                      <a:tailEnd type="none" w="med" len="med"/>
+                    </a:lnL>
+                    <a:lnR w="12700" cap="flat" cmpd="sng" algn="ctr">
+                      <a:NoFill>
+                        <a:srgbClr val="000000"/>
+                      </a:NoFill>
+                      <a:prstDash val="solid"/>
+                      <a:round/>
+                      <a:headEnd type="none" w="med" len="med"/>
+                      <a:tailEnd type="none" w="med" len="med"/>
+                    </a:lnR>
+                    <a:lnT w="12700" cap="flat" cmpd="sng" algn="ctr">
+                      <a:NoFill>
+                        <a:srgbClr val="000000"/>
+                      </a:NoFill>
+                      <a:prstDash val="solid"/>
+                      <a:round/>
+                      <a:headEnd type="none" w="med" len="med"/>
+                      <a:tailEnd type="none" w="med" len="med"/>
+                    </a:lnT>
+                    <a:lnB w="12700" cap="flat" cmpd="sng" algn="ctr">
+                      <a:NoFill>
+                        <a:srgbClr val="000000"/>
+                      </a:NoFill>
+                      <a:prstDash val="solid"/>
+                      <a:round/>
+                      <a:headEnd type="none" w="med" len="med"/>
+                      <a:tailEnd type="none" w="med" len="med"/>
+                    </a:lnB>
+                    <a:solidFill>
+                      <a:srgbClr val="FFFFF2"/>
+                    </a:solidFill>
+                  </a:tcPr>
+                </a:tc>
+                <a:tc>
+                  <a:txBody>
+                    <a:bodyPr/>
+                    <a:lstStyle/>
+                    <a:p>
+                      <a:pPr>
+                        <a:defRPr>
+                          <a:solidFill>
+                            <a:srgbClr val="051E4A"/>
+                          </a:solidFill>
+                        </a:defRPr>
+                      </a:pPr>
+                      <a:r>
+                        <a:t>A</a:t>
+                      </a:r>
+                    </a:p>
+                  </a:txBody>
+                  <a:tcPr>
+                    <a:lnL w="12700" cap="flat" cmpd="sng" algn="ctr">
+                      <a:NoFill>
+                        <a:srgbClr val="000000"/>
+                      </a:NoFill>
+                      <a:prstDash val="solid"/>
+                      <a:round/>
+                      <a:headEnd type="none" w="med" len="med"/>
+                      <a:tailEnd type="none" w="med" len="med"/>
+                    </a:lnL>
+                    <a:lnR w="12700" cap="flat" cmpd="sng" algn="ctr">
+                      <a:NoFill>
+                        <a:srgbClr val="000000"/>
+                      </a:NoFill>
+                      <a:prstDash val="solid"/>
+                      <a:round/>
+                      <a:headEnd type="none" w="med" len="med"/>
+                      <a:tailEnd type="none" w="med" len="med"/>
+                    </a:lnR>
+                    <a:lnT w="12700" cap="flat" cmpd="sng" algn="ctr">
+                      <a:NoFill>
+                        <a:srgbClr val="000000"/>
+                      </a:NoFill>
+                      <a:prstDash val="solid"/>
+                      <a:round/>
+                      <a:headEnd type="none" w="med" len="med"/>
+                      <a:tailEnd type="none" w="med" len="med"/>
+                    </a:lnT>
+                    <a:lnB w="12700" cap="flat" cmpd="sng" algn="ctr">
+                      <a:NoFill>
+                        <a:srgbClr val="000000"/>
+                      </a:NoFill>
+                      <a:prstDash val="solid"/>
+                      <a:round/>
+                      <a:headEnd type="none" w="med" len="med"/>
+                      <a:tailEnd type="none" w="med" len="med"/>
+                    </a:lnB>
+                    <a:solidFill>
+                      <a:srgbClr val="FFFFF2"/>
+                    </a:solidFill>
+                  </a:tcPr>
+                </a:tc>
+                <a:tc>
+                  <a:txBody>
+                    <a:bodyPr/>
+                    <a:lstStyle/>
+                    <a:p>
+                      <a:pPr>
+                        <a:defRPr>
+                          <a:solidFill>
+                            <a:srgbClr val="051E4A"/>
+                          </a:solidFill>
+                        </a:defRPr>
+                      </a:pPr>
+                      <a:r>
+                        <a:t>$13</a:t>
+                      </a:r>
+                    </a:p>
+                  </a:txBody>
+                  <a:tcPr>
+                    <a:lnL w="12700" cap="flat" cmpd="sng" algn="ctr">
+                      <a:NoFill>
+                        <a:srgbClr val="000000"/>
+                      </a:NoFill>
+                      <a:prstDash val="solid"/>
+                      <a:round/>
+                      <a:headEnd type="none" w="med" len="med"/>
+                      <a:tailEnd type="none" w="med" len="med"/>
+                    </a:lnL>
+                    <a:lnR w="12700" cap="flat" cmpd="sng" algn="ctr">
+                      <a:NoFill>
+                        <a:srgbClr val="000000"/>
+                      </a:NoFill>
+                      <a:prstDash val="solid"/>
+                      <a:round/>
+                      <a:headEnd type="none" w="med" len="med"/>
+                      <a:tailEnd type="none" w="med" len="med"/>
+                    </a:lnR>
+                    <a:lnT w="12700" cap="flat" cmpd="sng" algn="ctr">
+                      <a:NoFill>
+                        <a:srgbClr val="000000"/>
+                      </a:NoFill>
+                      <a:prstDash val="solid"/>
+                      <a:round/>
+                      <a:headEnd type="none" w="med" len="med"/>
+                      <a:tailEnd type="none" w="med" len="med"/>
+                    </a:lnT>
+                    <a:lnB w="12700" cap="flat" cmpd="sng" algn="ctr">
+                      <a:NoFill>
+                        <a:srgbClr val="000000"/>
+                      </a:NoFill>
+                      <a:prstDash val="solid"/>
+                      <a:round/>
+                      <a:headEnd type="none" w="med" len="med"/>
+                      <a:tailEnd type="none" w="med" len="med"/>
+                    </a:lnB>
+                    <a:solidFill>
+                      <a:srgbClr val="5EED4E"/>
+                    </a:solidFill>
+                  </a:tcPr>
+                </a:tc>
+              </a:tr>
+              <a:tr h="370840">
+                <a:tc>
+                  <a:txBody>
+                    <a:bodyPr/>
+                    <a:lstStyle/>
+                    <a:p>
+                      <a:pPr>
+                        <a:defRPr>
+                          <a:solidFill>
+                            <a:srgbClr val="051E4A"/>
+                          </a:solidFill>
+                        </a:defRPr>
+                      </a:pPr>
+                      <a:r>
+                        <a:t>10</a:t>
+                      </a:r>
+                    </a:p>
+                  </a:txBody>
+                  <a:tcPr>
+                    <a:lnL w="12700" cap="flat" cmpd="sng" algn="ctr">
+                      <a:NoFill>
+                        <a:srgbClr val="000000"/>
+                      </a:NoFill>
+                      <a:prstDash val="solid"/>
+                      <a:round/>
+                      <a:headEnd type="none" w="med" len="med"/>
+                      <a:tailEnd type="none" w="med" len="med"/>
+                    </a:lnL>
+                    <a:lnR w="12700" cap="flat" cmpd="sng" algn="ctr">
+                      <a:NoFill>
+                        <a:srgbClr val="000000"/>
+                      </a:NoFill>
+                      <a:prstDash val="solid"/>
+                      <a:round/>
+                      <a:headEnd type="none" w="med" len="med"/>
+                      <a:tailEnd type="none" w="med" len="med"/>
+                    </a:lnR>
+                    <a:lnT w="12700" cap="flat" cmpd="sng" algn="ctr">
+                      <a:NoFill>
+                        <a:srgbClr val="000000"/>
+                      </a:NoFill>
+                      <a:prstDash val="solid"/>
+                      <a:round/>
+                      <a:headEnd type="none" w="med" len="med"/>
+                      <a:tailEnd type="none" w="med" len="med"/>
+                    </a:lnT>
+                    <a:lnB w="12700" cap="flat" cmpd="sng" algn="ctr">
+                      <a:NoFill>
+                        <a:srgbClr val="000000"/>
+                      </a:NoFill>
+                      <a:prstDash val="solid"/>
+                      <a:round/>
+                      <a:headEnd type="none" w="med" len="med"/>
+                      <a:tailEnd type="none" w="med" len="med"/>
+                    </a:lnB>
+                    <a:solidFill>
+                      <a:srgbClr val="FFFFF2"/>
+                    </a:solidFill>
+                  </a:tcPr>
+                </a:tc>
+                <a:tc>
+                  <a:txBody>
+                    <a:bodyPr/>
+                    <a:lstStyle/>
+                    <a:p>
+                      <a:pPr>
+                        <a:defRPr>
+                          <a:solidFill>
+                            <a:srgbClr val="051E4A"/>
+                          </a:solidFill>
+                        </a:defRPr>
+                      </a:pPr>
+                      <a:r>
+                        <a:t>A</a:t>
+                      </a:r>
+                    </a:p>
+                  </a:txBody>
+                  <a:tcPr>
+                    <a:lnL w="12700" cap="flat" cmpd="sng" algn="ctr">
+                      <a:NoFill>
+                        <a:srgbClr val="000000"/>
+                      </a:NoFill>
+                      <a:prstDash val="solid"/>
+                      <a:round/>
+                      <a:headEnd type="none" w="med" len="med"/>
+                      <a:tailEnd type="none" w="med" len="med"/>
+                    </a:lnL>
+                    <a:lnR w="12700" cap="flat" cmpd="sng" algn="ctr">
+                      <a:NoFill>
+                        <a:srgbClr val="000000"/>
+                      </a:NoFill>
+                      <a:prstDash val="solid"/>
+                      <a:round/>
+                      <a:headEnd type="none" w="med" len="med"/>
+                      <a:tailEnd type="none" w="med" len="med"/>
+                    </a:lnR>
+                    <a:lnT w="12700" cap="flat" cmpd="sng" algn="ctr">
+                      <a:NoFill>
+                        <a:srgbClr val="000000"/>
+                      </a:NoFill>
+                      <a:prstDash val="solid"/>
+                      <a:round/>
+                      <a:headEnd type="none" w="med" len="med"/>
+                      <a:tailEnd type="none" w="med" len="med"/>
+                    </a:lnT>
+                    <a:lnB w="12700" cap="flat" cmpd="sng" algn="ctr">
+                      <a:NoFill>
+                        <a:srgbClr val="000000"/>
+                      </a:NoFill>
+                      <a:prstDash val="solid"/>
+                      <a:round/>
+                      <a:headEnd type="none" w="med" len="med"/>
+                      <a:tailEnd type="none" w="med" len="med"/>
+                    </a:lnB>
+                    <a:solidFill>
+                      <a:srgbClr val="FFFFF2"/>
+                    </a:solidFill>
+                  </a:tcPr>
+                </a:tc>
+                <a:tc>
+                  <a:txBody>
+                    <a:bodyPr/>
+                    <a:lstStyle/>
+                    <a:p>
+                      <a:pPr>
+                        <a:defRPr>
+                          <a:solidFill>
+                            <a:srgbClr val="051E4A"/>
+                          </a:solidFill>
+                        </a:defRPr>
+                      </a:pPr>
+                      <a:r>
+                        <a:t>$11</a:t>
+                      </a:r>
+                    </a:p>
+                  </a:txBody>
+                  <a:tcPr>
+                    <a:lnL w="12700" cap="flat" cmpd="sng" algn="ctr">
+                      <a:NoFill>
+                        <a:srgbClr val="000000"/>
+                      </a:NoFill>
+                      <a:prstDash val="solid"/>
+                      <a:round/>
+                      <a:headEnd type="none" w="med" len="med"/>
+                      <a:tailEnd type="none" w="med" len="med"/>
+                    </a:lnL>
+                    <a:lnR w="12700" cap="flat" cmpd="sng" algn="ctr">
+                      <a:NoFill>
+                        <a:srgbClr val="000000"/>
+                      </a:NoFill>
+                      <a:prstDash val="solid"/>
+                      <a:round/>
+                      <a:headEnd type="none" w="med" len="med"/>
+                      <a:tailEnd type="none" w="med" len="med"/>
+                    </a:lnR>
+                    <a:lnT w="12700" cap="flat" cmpd="sng" algn="ctr">
+                      <a:NoFill>
+                        <a:srgbClr val="000000"/>
+                      </a:NoFill>
+                      <a:prstDash val="solid"/>
+                      <a:round/>
+                      <a:headEnd type="none" w="med" len="med"/>
+                      <a:tailEnd type="none" w="med" len="med"/>
+                    </a:lnT>
+                    <a:lnB w="12700" cap="flat" cmpd="sng" algn="ctr">
+                      <a:NoFill>
+                        <a:srgbClr val="000000"/>
+                      </a:NoFill>
+                      <a:prstDash val="solid"/>
+                      <a:round/>
+                      <a:headEnd type="none" w="med" len="med"/>
+                      <a:tailEnd type="none" w="med" len="med"/>
+                    </a:lnB>
+                    <a:solidFill>
+                      <a:srgbClr val="5EED4E"/>
+                    </a:solidFill>
+                  </a:tcPr>
+                </a:tc>
+              </a:tr>
+              <a:tr h="370840">
+                <a:tc>
+                  <a:txBody>
+                    <a:bodyPr/>
+                    <a:lstStyle/>
+                    <a:p>
+                      <a:pPr>
+                        <a:defRPr>
+                          <a:solidFill>
+                            <a:srgbClr val="051E4A"/>
+                          </a:solidFill>
+                        </a:defRPr>
+                      </a:pPr>
+                      <a:r>
+                        <a:t>23</a:t>
+                      </a:r>
+                    </a:p>
+                  </a:txBody>
+                  <a:tcPr>
+                    <a:lnL w="12700" cap="flat" cmpd="sng" algn="ctr">
+                      <a:NoFill>
+                        <a:srgbClr val="000000"/>
+                      </a:NoFill>
+                      <a:prstDash val="solid"/>
+                      <a:round/>
+                      <a:headEnd type="none" w="med" len="med"/>
+                      <a:tailEnd type="none" w="med" len="med"/>
+                    </a:lnL>
+                    <a:lnR w="12700" cap="flat" cmpd="sng" algn="ctr">
+                      <a:NoFill>
+                        <a:srgbClr val="000000"/>
+                      </a:NoFill>
+                      <a:prstDash val="solid"/>
+                      <a:round/>
+                      <a:headEnd type="none" w="med" len="med"/>
+                      <a:tailEnd type="none" w="med" len="med"/>
+                    </a:lnR>
+                    <a:lnT w="12700" cap="flat" cmpd="sng" algn="ctr">
+                      <a:NoFill>
+                        <a:srgbClr val="000000"/>
+                      </a:NoFill>
+                      <a:prstDash val="solid"/>
+                      <a:round/>
+                      <a:headEnd type="none" w="med" len="med"/>
+                      <a:tailEnd type="none" w="med" len="med"/>
+                    </a:lnT>
+                    <a:lnB w="12700" cap="flat" cmpd="sng" algn="ctr">
+                      <a:NoFill>
+                        <a:srgbClr val="000000"/>
+                      </a:NoFill>
+                      <a:prstDash val="solid"/>
+                      <a:round/>
+                      <a:headEnd type="none" w="med" len="med"/>
+                      <a:tailEnd type="none" w="med" len="med"/>
+                    </a:lnB>
+                    <a:solidFill>
+                      <a:srgbClr val="FFFFF2"/>
+                    </a:solidFill>
+                  </a:tcPr>
+                </a:tc>
+                <a:tc>
+                  <a:txBody>
+                    <a:bodyPr/>
+                    <a:lstStyle/>
+                    <a:p>
+                      <a:pPr>
+                        <a:defRPr>
+                          <a:solidFill>
+                            <a:srgbClr val="051E4A"/>
+                          </a:solidFill>
+                        </a:defRPr>
+                      </a:pPr>
+                      <a:r>
+                        <a:t>A</a:t>
+                      </a:r>
+                    </a:p>
+                  </a:txBody>
+                  <a:tcPr>
+                    <a:lnL w="12700" cap="flat" cmpd="sng" algn="ctr">
+                      <a:NoFill>
+                        <a:srgbClr val="000000"/>
+                      </a:NoFill>
+                      <a:prstDash val="solid"/>
+                      <a:round/>
+                      <a:headEnd type="none" w="med" len="med"/>
+                      <a:tailEnd type="none" w="med" len="med"/>
+                    </a:lnL>
+                    <a:lnR w="12700" cap="flat" cmpd="sng" algn="ctr">
+                      <a:NoFill>
+                        <a:srgbClr val="000000"/>
+                      </a:NoFill>
+                      <a:prstDash val="solid"/>
+                      <a:round/>
+                      <a:headEnd type="none" w="med" len="med"/>
+                      <a:tailEnd type="none" w="med" len="med"/>
+                    </a:lnR>
+                    <a:lnT w="12700" cap="flat" cmpd="sng" algn="ctr">
+                      <a:NoFill>
+                        <a:srgbClr val="000000"/>
+                      </a:NoFill>
+                      <a:prstDash val="solid"/>
+                      <a:round/>
+                      <a:headEnd type="none" w="med" len="med"/>
+                      <a:tailEnd type="none" w="med" len="med"/>
+                    </a:lnT>
+                    <a:lnB w="12700" cap="flat" cmpd="sng" algn="ctr">
+                      <a:NoFill>
+                        <a:srgbClr val="000000"/>
+                      </a:NoFill>
+                      <a:prstDash val="solid"/>
+                      <a:round/>
+                      <a:headEnd type="none" w="med" len="med"/>
+                      <a:tailEnd type="none" w="med" len="med"/>
+                    </a:lnB>
+                    <a:solidFill>
+                      <a:srgbClr val="FFFFF2"/>
+                    </a:solidFill>
+                  </a:tcPr>
+                </a:tc>
+                <a:tc>
+                  <a:txBody>
+                    <a:bodyPr/>
+                    <a:lstStyle/>
+                    <a:p>
+                      <a:pPr>
+                        <a:defRPr>
+                          <a:solidFill>
+                            <a:srgbClr val="051E4A"/>
+                          </a:solidFill>
+                        </a:defRPr>
+                      </a:pPr>
+                      <a:r>
+                        <a:t>$25</a:t>
+                      </a:r>
+                    </a:p>
+                  </a:txBody>
+                  <a:tcPr>
+                    <a:lnL w="12700" cap="flat" cmpd="sng" algn="ctr">
+                      <a:NoFill>
+                        <a:srgbClr val="000000"/>
+                      </a:NoFill>
+                      <a:prstDash val="solid"/>
+                      <a:round/>
+                      <a:headEnd type="none" w="med" len="med"/>
+                      <a:tailEnd type="none" w="med" len="med"/>
+                    </a:lnL>
+                    <a:lnR w="12700" cap="flat" cmpd="sng" algn="ctr">
+                      <a:NoFill>
+                        <a:srgbClr val="000000"/>
+                      </a:NoFill>
+                      <a:prstDash val="solid"/>
+                      <a:round/>
+                      <a:headEnd type="none" w="med" len="med"/>
+                      <a:tailEnd type="none" w="med" len="med"/>
+                    </a:lnR>
+                    <a:lnT w="12700" cap="flat" cmpd="sng" algn="ctr">
+                      <a:NoFill>
+                        <a:srgbClr val="000000"/>
+                      </a:NoFill>
+                      <a:prstDash val="solid"/>
+                      <a:round/>
+                      <a:headEnd type="none" w="med" len="med"/>
+                      <a:tailEnd type="none" w="med" len="med"/>
+                    </a:lnT>
+                    <a:lnB w="12700" cap="flat" cmpd="sng" algn="ctr">
+                      <a:NoFill>
+                        <a:srgbClr val="000000"/>
+                      </a:NoFill>
+                      <a:prstDash val="solid"/>
+                      <a:round/>
+                      <a:headEnd type="none" w="med" len="med"/>
+                      <a:tailEnd type="none" w="med" len="med"/>
+                    </a:lnB>
+                    <a:solidFill>
+                      <a:srgbClr val="5EED4E"/>
+                    </a:solidFill>
+                  </a:tcPr>
+                </a:tc>
+              </a:tr>
+            </a:tbl>
+          </a:graphicData>
+        </a:graphic>
+      </p:graphicFrame>
+    </p:spTree>
+  </p:cSld>
+  <p:clrMapOvr>
+    <a:masterClrMapping/>
+  </p:clrMapOvr>
+</p:sld>
+</file>
+
+<file path=ppt/slides/slide8.xml><?xml version="1.0" encoding="utf-8"?>
+<p:sld xmlns:a="http://schemas.openxmlformats.org/drawingml/2006/main" xmlns:p="http://schemas.openxmlformats.org/presentationml/2006/main" xmlns:r="http://schemas.openxmlformats.org/officeDocument/2006/relationships">
+  <p:cSld>
+    <p:spTree>
+      <p:nvGrpSpPr>
+        <p:cNvPr id="1" name=""/>
+        <p:cNvGrpSpPr/>
+        <p:nvPr/>
+      </p:nvGrpSpPr>
+      <p:grpSpPr/>
+      <p:sp>
+        <p:nvSpPr>
+          <p:cNvPr id="2" name="Title 1"/>
+          <p:cNvSpPr>
+            <a:spLocks noGrp="1"/>
+          </p:cNvSpPr>
+          <p:nvPr>
+            <p:ph type="title"/>
+          </p:nvPr>
+        </p:nvSpPr>
+        <p:spPr/>
+        <p:txBody>
+          <a:bodyPr/>
+          <a:lstStyle/>
+          <a:p>
+            <a:r>
+              <a:t>Stock Prices by Company - Filled Line Chart</a:t>
+            </a:r>
+          </a:p>
+        </p:txBody>
+      </p:sp>
+      <p:pic>
+        <p:nvPicPr>
+          <p:cNvPr id="3" name="Picture Placeholder 2" descr="chart5.png"/>
+          <p:cNvPicPr>
+            <a:picLocks noGrp="1" noChangeAspect="1"/>
+          </p:cNvPicPr>
+          <p:nvPr>
+            <p:ph type="pic" idx="10" sz="quarter"/>
+          </p:nvPr>
+        </p:nvPicPr>
+        <p:blipFill>
+          <a:blip r:embed="rId2"/>
+          <a:srcRect l="1001" r="1001"/>
+          <a:stretch>
+            <a:fillRect/>
+          </a:stretch>
+        </p:blipFill>
+        <p:spPr/>
+      </p:pic>
+      <p:sp>
+        <p:nvSpPr>
+          <p:cNvPr id="4" name="Text Placeholder 3"/>
+          <p:cNvSpPr>
+            <a:spLocks noGrp="1"/>
+          </p:cNvSpPr>
+          <p:nvPr>
+            <p:ph type="body" idx="11" sz="quarter"/>
+          </p:nvPr>
+        </p:nvSpPr>
+        <p:spPr/>
+        <p:txBody>
+          <a:bodyPr/>
+          <a:lstStyle/>
+          <a:p>
+            <a:r>
+              <a:t>Grouping by additional variables is easy</a:t>
+            </a:r>
+          </a:p>
+        </p:txBody>
+      </p:sp>
+    </p:spTree>
+  </p:cSld>
+  <p:clrMapOvr>
+    <a:masterClrMapping/>
+  </p:clrMapOvr>
+</p:sld>
+</file>
+
+<file path=ppt/slides/slide9.xml><?xml version="1.0" encoding="utf-8"?>
+<p:sld xmlns:a="http://schemas.openxmlformats.org/drawingml/2006/main" xmlns:p="http://schemas.openxmlformats.org/presentationml/2006/main" xmlns:r="http://schemas.openxmlformats.org/officeDocument/2006/relationships">
+  <p:cSld>
+    <p:spTree>
+      <p:nvGrpSpPr>
+        <p:cNvPr id="1" name=""/>
+        <p:cNvGrpSpPr/>
+        <p:nvPr/>
+      </p:nvGrpSpPr>
+      <p:grpSpPr/>
+      <p:sp>
+        <p:nvSpPr>
+          <p:cNvPr id="2" name="Title 1"/>
+          <p:cNvSpPr>
+            <a:spLocks noGrp="1"/>
+          </p:cNvSpPr>
+          <p:nvPr>
+            <p:ph type="title"/>
+          </p:nvPr>
+        </p:nvSpPr>
+        <p:spPr/>
+        <p:txBody>
+          <a:bodyPr/>
+          <a:lstStyle/>
+          <a:p>
+            <a:r>
+              <a:t>Facet Filled Line</a:t>
+            </a:r>
+          </a:p>
+        </p:txBody>
+      </p:sp>
+      <p:pic>
+        <p:nvPicPr>
+          <p:cNvPr id="3" name="Picture Placeholder 2" descr="chart6.png"/>
+          <p:cNvPicPr>
+            <a:picLocks noGrp="1" noChangeAspect="1"/>
+          </p:cNvPicPr>
+          <p:nvPr>
+            <p:ph type="pic" idx="10" sz="quarter"/>
+          </p:nvPr>
+        </p:nvPicPr>
+        <p:blipFill>
+          <a:blip r:embed="rId2"/>
+          <a:srcRect l="1001" r="1001"/>
+          <a:stretch>
+            <a:fillRect/>
+          </a:stretch>
+        </p:blipFill>
+        <p:spPr/>
+      </p:pic>
+      <p:sp>
+        <p:nvSpPr>
+          <p:cNvPr id="4" name="Text Placeholder 3"/>
+          <p:cNvSpPr>
+            <a:spLocks noGrp="1"/>
+          </p:cNvSpPr>
+          <p:nvPr>
+            <p:ph type="body" idx="11" sz="quarter"/>
+          </p:nvPr>
+        </p:nvSpPr>
+        <p:spPr/>
+        <p:txBody>
+          <a:bodyPr/>
+          <a:lstStyle/>
+          <a:p>
+            <a:r>
+              <a:t>Grouping by additional variables is easy</a:t>
             </a:r>
           </a:p>
         </p:txBody>

</xml_diff>

<commit_message>
allowing for font size changes in tables
</commit_message>
<xml_diff>
--- a/example/output2.pptx
+++ b/example/output2.pptx
@@ -20714,7 +20714,7 @@
                     <a:lstStyle/>
                     <a:p>
                       <a:pPr>
-                        <a:defRPr>
+                        <a:defRPr sz="1800">
                           <a:solidFill>
                             <a:srgbClr val="FFFFFF"/>
                           </a:solidFill>
@@ -20773,7 +20773,7 @@
                     <a:lstStyle/>
                     <a:p>
                       <a:pPr>
-                        <a:defRPr>
+                        <a:defRPr sz="1800">
                           <a:solidFill>
                             <a:srgbClr val="FFFFFF"/>
                           </a:solidFill>
@@ -20832,7 +20832,7 @@
                     <a:lstStyle/>
                     <a:p>
                       <a:pPr>
-                        <a:defRPr>
+                        <a:defRPr sz="1800">
                           <a:solidFill>
                             <a:srgbClr val="FFFFFF"/>
                           </a:solidFill>
@@ -20893,7 +20893,7 @@
                     <a:lstStyle/>
                     <a:p>
                       <a:pPr>
-                        <a:defRPr>
+                        <a:defRPr sz="800">
                           <a:solidFill>
                             <a:srgbClr val="051E4A"/>
                           </a:solidFill>
@@ -20952,7 +20952,7 @@
                     <a:lstStyle/>
                     <a:p>
                       <a:pPr>
-                        <a:defRPr>
+                        <a:defRPr sz="800">
                           <a:solidFill>
                             <a:srgbClr val="051E4A"/>
                           </a:solidFill>
@@ -21011,7 +21011,7 @@
                     <a:lstStyle/>
                     <a:p>
                       <a:pPr>
-                        <a:defRPr>
+                        <a:defRPr sz="800">
                           <a:solidFill>
                             <a:srgbClr val="051E4A"/>
                           </a:solidFill>
@@ -21072,7 +21072,7 @@
                     <a:lstStyle/>
                     <a:p>
                       <a:pPr>
-                        <a:defRPr>
+                        <a:defRPr sz="800">
                           <a:solidFill>
                             <a:srgbClr val="051E4A"/>
                           </a:solidFill>
@@ -21131,7 +21131,7 @@
                     <a:lstStyle/>
                     <a:p>
                       <a:pPr>
-                        <a:defRPr>
+                        <a:defRPr sz="800">
                           <a:solidFill>
                             <a:srgbClr val="051E4A"/>
                           </a:solidFill>
@@ -21190,7 +21190,7 @@
                     <a:lstStyle/>
                     <a:p>
                       <a:pPr>
-                        <a:defRPr>
+                        <a:defRPr sz="800">
                           <a:solidFill>
                             <a:srgbClr val="051E4A"/>
                           </a:solidFill>
@@ -21251,7 +21251,7 @@
                     <a:lstStyle/>
                     <a:p>
                       <a:pPr>
-                        <a:defRPr>
+                        <a:defRPr sz="800">
                           <a:solidFill>
                             <a:srgbClr val="051E4A"/>
                           </a:solidFill>
@@ -21310,7 +21310,7 @@
                     <a:lstStyle/>
                     <a:p>
                       <a:pPr>
-                        <a:defRPr>
+                        <a:defRPr sz="800">
                           <a:solidFill>
                             <a:srgbClr val="051E4A"/>
                           </a:solidFill>
@@ -21369,7 +21369,7 @@
                     <a:lstStyle/>
                     <a:p>
                       <a:pPr>
-                        <a:defRPr>
+                        <a:defRPr sz="800">
                           <a:solidFill>
                             <a:srgbClr val="051E4A"/>
                           </a:solidFill>
@@ -21427,7 +21427,7 @@
                     <a:lstStyle/>
                     <a:p>
                       <a:pPr>
-                        <a:defRPr>
+                        <a:defRPr sz="800">
                           <a:solidFill>
                             <a:srgbClr val="051E4A"/>
                           </a:solidFill>
@@ -21486,7 +21486,7 @@
                     <a:lstStyle/>
                     <a:p>
                       <a:pPr>
-                        <a:defRPr>
+                        <a:defRPr sz="800">
                           <a:solidFill>
                             <a:srgbClr val="051E4A"/>
                           </a:solidFill>
@@ -21545,7 +21545,7 @@
                     <a:lstStyle/>
                     <a:p>
                       <a:pPr>
-                        <a:defRPr>
+                        <a:defRPr sz="800">
                           <a:solidFill>
                             <a:srgbClr val="051E4A"/>
                           </a:solidFill>
@@ -21606,7 +21606,7 @@
                     <a:lstStyle/>
                     <a:p>
                       <a:pPr>
-                        <a:defRPr>
+                        <a:defRPr sz="800">
                           <a:solidFill>
                             <a:srgbClr val="051E4A"/>
                           </a:solidFill>
@@ -21665,7 +21665,7 @@
                     <a:lstStyle/>
                     <a:p>
                       <a:pPr>
-                        <a:defRPr>
+                        <a:defRPr sz="800">
                           <a:solidFill>
                             <a:srgbClr val="051E4A"/>
                           </a:solidFill>
@@ -21724,7 +21724,7 @@
                     <a:lstStyle/>
                     <a:p>
                       <a:pPr>
-                        <a:defRPr>
+                        <a:defRPr sz="800">
                           <a:solidFill>
                             <a:srgbClr val="051E4A"/>
                           </a:solidFill>
@@ -21785,7 +21785,7 @@
                     <a:lstStyle/>
                     <a:p>
                       <a:pPr>
-                        <a:defRPr>
+                        <a:defRPr sz="800">
                           <a:solidFill>
                             <a:srgbClr val="051E4A"/>
                           </a:solidFill>
@@ -21844,7 +21844,7 @@
                     <a:lstStyle/>
                     <a:p>
                       <a:pPr>
-                        <a:defRPr>
+                        <a:defRPr sz="800">
                           <a:solidFill>
                             <a:srgbClr val="051E4A"/>
                           </a:solidFill>
@@ -21903,7 +21903,7 @@
                     <a:lstStyle/>
                     <a:p>
                       <a:pPr>
-                        <a:defRPr>
+                        <a:defRPr sz="800">
                           <a:solidFill>
                             <a:srgbClr val="051E4A"/>
                           </a:solidFill>
@@ -21964,7 +21964,7 @@
                     <a:lstStyle/>
                     <a:p>
                       <a:pPr>
-                        <a:defRPr>
+                        <a:defRPr sz="800">
                           <a:solidFill>
                             <a:srgbClr val="051E4A"/>
                           </a:solidFill>
@@ -22023,7 +22023,7 @@
                     <a:lstStyle/>
                     <a:p>
                       <a:pPr>
-                        <a:defRPr>
+                        <a:defRPr sz="800">
                           <a:solidFill>
                             <a:srgbClr val="051E4A"/>
                           </a:solidFill>
@@ -22082,7 +22082,7 @@
                     <a:lstStyle/>
                     <a:p>
                       <a:pPr>
-                        <a:defRPr>
+                        <a:defRPr sz="800">
                           <a:solidFill>
                             <a:srgbClr val="051E4A"/>
                           </a:solidFill>
@@ -22143,7 +22143,7 @@
                     <a:lstStyle/>
                     <a:p>
                       <a:pPr>
-                        <a:defRPr>
+                        <a:defRPr sz="800">
                           <a:solidFill>
                             <a:srgbClr val="051E4A"/>
                           </a:solidFill>
@@ -22202,7 +22202,7 @@
                     <a:lstStyle/>
                     <a:p>
                       <a:pPr>
-                        <a:defRPr>
+                        <a:defRPr sz="800">
                           <a:solidFill>
                             <a:srgbClr val="051E4A"/>
                           </a:solidFill>
@@ -22261,7 +22261,7 @@
                     <a:lstStyle/>
                     <a:p>
                       <a:pPr>
-                        <a:defRPr>
+                        <a:defRPr sz="800">
                           <a:solidFill>
                             <a:srgbClr val="051E4A"/>
                           </a:solidFill>

</xml_diff>